<commit_message>
Plots, plots, plot, spam
</commit_message>
<xml_diff>
--- a/doc/poster_final_femke_deel.pptx
+++ b/doc/poster_final_femke_deel.pptx
@@ -105,6 +105,18 @@
     </a:lvl9pPr>
   </p:defaultTextStyle>
   <p:extLst>
+    <p:ext uri="{521415D9-36F7-43E2-AB2F-B90AF26B5E84}">
+      <p14:sectionLst xmlns:p14="http://schemas.microsoft.com/office/powerpoint/2010/main">
+        <p14:section name="Naamloze sectie" id="{01810474-5217-4AD5-844D-85DDB4C4BADF}">
+          <p14:sldIdLst/>
+        </p14:section>
+        <p14:section name="Naamloze sectie" id="{28E8E83F-D616-4AE9-B01C-675565659E91}">
+          <p14:sldIdLst>
+            <p14:sldId id="256"/>
+          </p14:sldIdLst>
+        </p14:section>
+      </p14:sectionLst>
+    </p:ext>
     <p:ext uri="{EFAFB233-063F-42B5-8137-9DF3F51BA10A}">
       <p15:sldGuideLst xmlns:p15="http://schemas.microsoft.com/office/powerpoint/2012/main">
         <p15:guide id="1" orient="horz" pos="3368">
@@ -3080,6 +3092,157 @@
           <a:chExt cx="0" cy="0"/>
         </a:xfrm>
       </p:grpSpPr>
+      <p:pic>
+        <p:nvPicPr>
+          <p:cNvPr id="1034" name="Picture 10" descr="C:\Users\Aline\Downloads\Faeded.jpg"/>
+          <p:cNvPicPr>
+            <a:picLocks noChangeAspect="1" noChangeArrowheads="1"/>
+          </p:cNvPicPr>
+          <p:nvPr/>
+        </p:nvPicPr>
+        <p:blipFill>
+          <a:blip r:embed="rId2" cstate="print"/>
+          <a:srcRect t="74515" b="15291"/>
+          <a:stretch>
+            <a:fillRect/>
+          </a:stretch>
+        </p:blipFill>
+        <p:spPr bwMode="auto">
+          <a:xfrm rot="10800000">
+            <a:off x="2844527" y="2754412"/>
+            <a:ext cx="4716736" cy="288032"/>
+          </a:xfrm>
+          <a:prstGeom prst="rect">
+            <a:avLst/>
+          </a:prstGeom>
+          <a:noFill/>
+          <a:ln>
+            <a:solidFill>
+              <a:srgbClr val="4E2D12"/>
+            </a:solidFill>
+          </a:ln>
+        </p:spPr>
+      </p:pic>
+      <p:pic>
+        <p:nvPicPr>
+          <p:cNvPr id="1033" name="Picture 9" descr="C:\Users\Aline\Downloads\Faeded.jpg"/>
+          <p:cNvPicPr>
+            <a:picLocks noChangeAspect="1" noChangeArrowheads="1"/>
+          </p:cNvPicPr>
+          <p:nvPr/>
+        </p:nvPicPr>
+        <p:blipFill>
+          <a:blip r:embed="rId2" cstate="print">
+            <a:lum bright="10000" contrast="10000"/>
+          </a:blip>
+          <a:srcRect t="1739" r="91887"/>
+          <a:stretch>
+            <a:fillRect/>
+          </a:stretch>
+        </p:blipFill>
+        <p:spPr bwMode="auto">
+          <a:xfrm rot="16200000">
+            <a:off x="5053890" y="7097780"/>
+            <a:ext cx="298016" cy="4716736"/>
+          </a:xfrm>
+          <a:prstGeom prst="rect">
+            <a:avLst/>
+          </a:prstGeom>
+          <a:noFill/>
+        </p:spPr>
+      </p:pic>
+      <p:pic>
+        <p:nvPicPr>
+          <p:cNvPr id="1032" name="Picture 8" descr="C:\Users\Aline\Downloads\Faeded.jpg"/>
+          <p:cNvPicPr>
+            <a:picLocks noChangeAspect="1" noChangeArrowheads="1"/>
+          </p:cNvPicPr>
+          <p:nvPr/>
+        </p:nvPicPr>
+        <p:blipFill>
+          <a:blip r:embed="rId3" cstate="print">
+            <a:lum contrast="5000"/>
+          </a:blip>
+          <a:srcRect t="64635" b="3047"/>
+          <a:stretch>
+            <a:fillRect/>
+          </a:stretch>
+        </p:blipFill>
+        <p:spPr bwMode="auto">
+          <a:xfrm>
+            <a:off x="0" y="2754412"/>
+            <a:ext cx="2775405" cy="288032"/>
+          </a:xfrm>
+          <a:prstGeom prst="rect">
+            <a:avLst/>
+          </a:prstGeom>
+          <a:noFill/>
+          <a:ln>
+            <a:solidFill>
+              <a:srgbClr val="4E2D12"/>
+            </a:solidFill>
+          </a:ln>
+        </p:spPr>
+      </p:pic>
+      <p:pic>
+        <p:nvPicPr>
+          <p:cNvPr id="1031" name="Picture 7" descr="C:\Users\Aline\Downloads\Faeded.jpg"/>
+          <p:cNvPicPr>
+            <a:picLocks noChangeAspect="1" noChangeArrowheads="1"/>
+          </p:cNvPicPr>
+          <p:nvPr/>
+        </p:nvPicPr>
+        <p:blipFill>
+          <a:blip r:embed="rId2" cstate="print">
+            <a:lum contrast="10000"/>
+          </a:blip>
+          <a:srcRect b="70464"/>
+          <a:stretch>
+            <a:fillRect/>
+          </a:stretch>
+        </p:blipFill>
+        <p:spPr bwMode="auto">
+          <a:xfrm>
+            <a:off x="0" y="0"/>
+            <a:ext cx="7561263" cy="1026220"/>
+          </a:xfrm>
+          <a:prstGeom prst="rect">
+            <a:avLst/>
+          </a:prstGeom>
+          <a:noFill/>
+          <a:ln>
+            <a:solidFill>
+              <a:srgbClr val="4E2D12"/>
+            </a:solidFill>
+          </a:ln>
+        </p:spPr>
+      </p:pic>
+      <p:pic>
+        <p:nvPicPr>
+          <p:cNvPr id="1029" name="Picture 5" descr="C:\Users\Aline\Downloads\dna-modified-tree-genetic-4433322.jpg"/>
+          <p:cNvPicPr>
+            <a:picLocks noChangeAspect="1" noChangeArrowheads="1"/>
+          </p:cNvPicPr>
+          <p:nvPr/>
+        </p:nvPicPr>
+        <p:blipFill>
+          <a:blip r:embed="rId4" cstate="print"/>
+          <a:srcRect/>
+          <a:stretch>
+            <a:fillRect/>
+          </a:stretch>
+        </p:blipFill>
+        <p:spPr bwMode="auto">
+          <a:xfrm>
+            <a:off x="468263" y="4986660"/>
+            <a:ext cx="1030287" cy="1316037"/>
+          </a:xfrm>
+          <a:prstGeom prst="rect">
+            <a:avLst/>
+          </a:prstGeom>
+          <a:noFill/>
+        </p:spPr>
+      </p:pic>
       <p:sp>
         <p:nvSpPr>
           <p:cNvPr id="4" name="Rectangle 3"/>
@@ -3094,6 +3257,12 @@
           <a:prstGeom prst="rect">
             <a:avLst/>
           </a:prstGeom>
+          <a:noFill/>
+          <a:ln>
+            <a:solidFill>
+              <a:srgbClr val="492303"/>
+            </a:solidFill>
+          </a:ln>
         </p:spPr>
         <p:style>
           <a:lnRef idx="2">
@@ -3119,7 +3288,7 @@
             <a:r>
               <a:rPr lang="nl-NL" sz="2400" b="1" dirty="0" smtClean="0">
                 <a:solidFill>
-                  <a:schemeClr val="bg1"/>
+                  <a:srgbClr val="492303"/>
                 </a:solidFill>
               </a:rPr>
               <a:t>Inferring</a:t>
@@ -3127,7 +3296,7 @@
             <a:r>
               <a:rPr lang="nl-NL" sz="2400" dirty="0" smtClean="0">
                 <a:solidFill>
-                  <a:schemeClr val="bg1"/>
+                  <a:srgbClr val="492303"/>
                 </a:solidFill>
               </a:rPr>
               <a:t> </a:t>
@@ -3135,7 +3304,7 @@
             <a:r>
               <a:rPr lang="nl-NL" sz="2400" b="1" dirty="0" smtClean="0">
                 <a:solidFill>
-                  <a:schemeClr val="bg1"/>
+                  <a:srgbClr val="492303"/>
                 </a:solidFill>
               </a:rPr>
               <a:t>Phylogenies</a:t>
@@ -3143,7 +3312,7 @@
             <a:r>
               <a:rPr lang="nl-NL" sz="2400" dirty="0" smtClean="0">
                 <a:solidFill>
-                  <a:schemeClr val="bg1"/>
+                  <a:srgbClr val="492303"/>
                 </a:solidFill>
               </a:rPr>
               <a:t>:</a:t>
@@ -3154,12 +3323,16 @@
             <a:r>
               <a:rPr lang="nl-NL" dirty="0" smtClean="0">
                 <a:solidFill>
-                  <a:schemeClr val="bg1"/>
+                  <a:srgbClr val="492303"/>
                 </a:solidFill>
               </a:rPr>
               <a:t>BEAST2 and the Protracted Birth-Death Model</a:t>
             </a:r>
-            <a:endParaRPr lang="en-GB" dirty="0"/>
+            <a:endParaRPr lang="en-GB" dirty="0">
+              <a:solidFill>
+                <a:srgbClr val="492303"/>
+              </a:solidFill>
+            </a:endParaRPr>
           </a:p>
         </p:txBody>
       </p:sp>
@@ -3171,13 +3344,18 @@
         </p:nvSpPr>
         <p:spPr>
           <a:xfrm>
-            <a:off x="2877353" y="2754412"/>
-            <a:ext cx="4683910" cy="3705211"/>
+            <a:off x="2844528" y="2754412"/>
+            <a:ext cx="4716736" cy="3739503"/>
           </a:xfrm>
           <a:prstGeom prst="rect">
             <a:avLst/>
           </a:prstGeom>
           <a:noFill/>
+          <a:ln>
+            <a:solidFill>
+              <a:srgbClr val="4E2D12"/>
+            </a:solidFill>
+          </a:ln>
         </p:spPr>
         <p:style>
           <a:lnRef idx="2">
@@ -3213,12 +3391,17 @@
         <p:spPr>
           <a:xfrm>
             <a:off x="0" y="2754412"/>
-            <a:ext cx="2844527" cy="7938988"/>
+            <a:ext cx="2775405" cy="7938988"/>
           </a:xfrm>
           <a:prstGeom prst="rect">
             <a:avLst/>
           </a:prstGeom>
           <a:noFill/>
+          <a:ln>
+            <a:solidFill>
+              <a:srgbClr val="4E2D12"/>
+            </a:solidFill>
+          </a:ln>
         </p:spPr>
         <p:style>
           <a:lnRef idx="2">
@@ -3253,13 +3436,18 @@
         </p:nvSpPr>
         <p:spPr>
           <a:xfrm>
-            <a:off x="2877353" y="9605156"/>
-            <a:ext cx="4683910" cy="1088244"/>
+            <a:off x="2844528" y="9605156"/>
+            <a:ext cx="4716736" cy="1088244"/>
           </a:xfrm>
           <a:prstGeom prst="rect">
             <a:avLst/>
           </a:prstGeom>
           <a:noFill/>
+          <a:ln>
+            <a:solidFill>
+              <a:srgbClr val="4E2D12"/>
+            </a:solidFill>
+          </a:ln>
         </p:spPr>
         <p:style>
           <a:lnRef idx="2">
@@ -3294,8 +3482,8 @@
         </p:nvSpPr>
         <p:spPr>
           <a:xfrm>
-            <a:off x="0" y="1036558"/>
-            <a:ext cx="3996655" cy="1754326"/>
+            <a:off x="3262" y="1035428"/>
+            <a:ext cx="3996655" cy="2031325"/>
           </a:xfrm>
           <a:prstGeom prst="rect">
             <a:avLst/>
@@ -3308,300 +3496,18 @@
           </a:bodyPr>
           <a:lstStyle/>
           <a:p>
-            <a:pPr algn="just"/>
-            <a:r>
-              <a:rPr lang="nl-NL" sz="900" dirty="0" smtClean="0"/>
-              <a:t>In nature, speciation takes time. </a:t>
-            </a:r>
-            <a:r>
-              <a:rPr lang="nl-NL" sz="900" dirty="0" err="1" smtClean="0"/>
-              <a:t>Despite</a:t>
-            </a:r>
-            <a:r>
-              <a:rPr lang="nl-NL" sz="900" dirty="0" smtClean="0"/>
-              <a:t> </a:t>
-            </a:r>
-            <a:r>
-              <a:rPr lang="nl-NL" sz="900" dirty="0" err="1" smtClean="0"/>
-              <a:t>this</a:t>
-            </a:r>
-            <a:r>
-              <a:rPr lang="nl-NL" sz="900" dirty="0" smtClean="0"/>
-              <a:t>, </a:t>
-            </a:r>
-            <a:r>
-              <a:rPr lang="nl-NL" sz="900" dirty="0" err="1" smtClean="0"/>
-              <a:t>many</a:t>
-            </a:r>
-            <a:r>
-              <a:rPr lang="nl-NL" sz="900" dirty="0" smtClean="0"/>
-              <a:t> </a:t>
-            </a:r>
-            <a:r>
-              <a:rPr lang="nl-NL" sz="900" dirty="0" smtClean="0"/>
-              <a:t>phylogenetic inference programs use models that assume speciation to happen </a:t>
-            </a:r>
-            <a:r>
-              <a:rPr lang="nl-NL" sz="900" dirty="0" err="1" smtClean="0"/>
-              <a:t>instantly</a:t>
-            </a:r>
-            <a:r>
-              <a:rPr lang="nl-NL" sz="900" dirty="0" smtClean="0"/>
-              <a:t>, like </a:t>
-            </a:r>
-            <a:r>
-              <a:rPr lang="nl-NL" sz="900" dirty="0" err="1" smtClean="0"/>
-              <a:t>the</a:t>
-            </a:r>
-            <a:r>
-              <a:rPr lang="nl-NL" sz="900" dirty="0" smtClean="0"/>
-              <a:t> pure </a:t>
-            </a:r>
-            <a:r>
-              <a:rPr lang="nl-NL" sz="900" dirty="0" err="1" smtClean="0"/>
-              <a:t>Birth-Death</a:t>
-            </a:r>
-            <a:r>
-              <a:rPr lang="nl-NL" sz="900" dirty="0" smtClean="0"/>
-              <a:t> model (BD). </a:t>
-            </a:r>
-            <a:r>
-              <a:rPr lang="nl-NL" sz="900" dirty="0" smtClean="0"/>
-              <a:t>However,  </a:t>
-            </a:r>
-            <a:r>
-              <a:rPr lang="nl-NL" sz="900" dirty="0" err="1" smtClean="0"/>
-              <a:t>experimental</a:t>
-            </a:r>
-            <a:r>
-              <a:rPr lang="nl-NL" sz="900" dirty="0" smtClean="0"/>
-              <a:t> data show </a:t>
-            </a:r>
-            <a:r>
-              <a:rPr lang="nl-NL" sz="900" dirty="0" smtClean="0"/>
-              <a:t>a slowdown in lineage accumulation towards the present, </a:t>
-            </a:r>
-            <a:r>
-              <a:rPr lang="nl-NL" sz="900" dirty="0" err="1" smtClean="0"/>
-              <a:t>contrary</a:t>
-            </a:r>
-            <a:r>
-              <a:rPr lang="nl-NL" sz="900" dirty="0" smtClean="0"/>
-              <a:t> </a:t>
-            </a:r>
-            <a:r>
-              <a:rPr lang="nl-NL" sz="900" dirty="0" err="1" smtClean="0"/>
-              <a:t>to</a:t>
-            </a:r>
-            <a:r>
-              <a:rPr lang="nl-NL" sz="900" dirty="0" smtClean="0"/>
-              <a:t> </a:t>
-            </a:r>
-            <a:r>
-              <a:rPr lang="nl-NL" sz="900" dirty="0" err="1" smtClean="0"/>
-              <a:t>the</a:t>
-            </a:r>
-            <a:r>
-              <a:rPr lang="nl-NL" sz="900" dirty="0" smtClean="0"/>
-              <a:t> </a:t>
-            </a:r>
-            <a:r>
-              <a:rPr lang="nl-NL" sz="900" dirty="0" err="1" smtClean="0"/>
-              <a:t>assumptions</a:t>
-            </a:r>
-            <a:r>
-              <a:rPr lang="nl-NL" sz="900" dirty="0" smtClean="0"/>
-              <a:t> of BD. </a:t>
-            </a:r>
-            <a:r>
-              <a:rPr lang="nl-NL" sz="900" dirty="0" smtClean="0"/>
-              <a:t>An extention of this model, the Protracted BD model (PBD), allows for speciation to take </a:t>
-            </a:r>
-            <a:r>
-              <a:rPr lang="nl-NL" sz="900" dirty="0" smtClean="0"/>
-              <a:t>time, </a:t>
-            </a:r>
-            <a:r>
-              <a:rPr lang="nl-NL" sz="900" dirty="0" err="1" smtClean="0"/>
-              <a:t>adding</a:t>
-            </a:r>
-            <a:r>
-              <a:rPr lang="nl-NL" sz="900" dirty="0"/>
-              <a:t> </a:t>
-            </a:r>
-            <a:r>
-              <a:rPr lang="nl-NL" sz="900" dirty="0" err="1" smtClean="0"/>
-              <a:t>an</a:t>
-            </a:r>
-            <a:r>
-              <a:rPr lang="nl-NL" sz="900" dirty="0" smtClean="0"/>
-              <a:t> </a:t>
-            </a:r>
-            <a:r>
-              <a:rPr lang="nl-NL" sz="900" dirty="0" err="1" smtClean="0"/>
-              <a:t>incipient</a:t>
-            </a:r>
-            <a:r>
-              <a:rPr lang="nl-NL" sz="900" dirty="0" smtClean="0"/>
-              <a:t> stage </a:t>
-            </a:r>
-            <a:r>
-              <a:rPr lang="nl-NL" sz="900" dirty="0" err="1" smtClean="0"/>
-              <a:t>before</a:t>
-            </a:r>
-            <a:r>
-              <a:rPr lang="nl-NL" sz="900" dirty="0" smtClean="0"/>
-              <a:t> a species </a:t>
-            </a:r>
-            <a:r>
-              <a:rPr lang="nl-NL" sz="900" dirty="0" err="1" smtClean="0"/>
-              <a:t>becomes</a:t>
-            </a:r>
-            <a:r>
-              <a:rPr lang="nl-NL" sz="900" dirty="0" smtClean="0"/>
-              <a:t> a </a:t>
-            </a:r>
-            <a:r>
-              <a:rPr lang="nl-NL" sz="900" dirty="0" err="1" smtClean="0"/>
-              <a:t>good</a:t>
-            </a:r>
-            <a:r>
-              <a:rPr lang="nl-NL" sz="900" dirty="0" smtClean="0"/>
-              <a:t> species</a:t>
-            </a:r>
-            <a:r>
-              <a:rPr lang="nl-NL" sz="900" dirty="0" smtClean="0"/>
-              <a:t>. In </a:t>
-            </a:r>
-            <a:r>
-              <a:rPr lang="nl-NL" sz="900" dirty="0" err="1" smtClean="0"/>
-              <a:t>this</a:t>
-            </a:r>
-            <a:r>
-              <a:rPr lang="nl-NL" sz="900" dirty="0" smtClean="0"/>
-              <a:t> research, we test </a:t>
-            </a:r>
-            <a:r>
-              <a:rPr lang="nl-NL" sz="900" dirty="0" err="1" smtClean="0"/>
-              <a:t>if</a:t>
-            </a:r>
-            <a:r>
-              <a:rPr lang="nl-NL" sz="900" dirty="0" smtClean="0"/>
-              <a:t> BEAST2, a </a:t>
-            </a:r>
-            <a:r>
-              <a:rPr lang="nl-NL" sz="900" dirty="0" err="1" smtClean="0"/>
-              <a:t>popular</a:t>
-            </a:r>
-            <a:r>
-              <a:rPr lang="nl-NL" sz="900" dirty="0"/>
-              <a:t> </a:t>
-            </a:r>
-            <a:r>
-              <a:rPr lang="nl-NL" sz="900" dirty="0" err="1" smtClean="0"/>
-              <a:t>phylogenetic</a:t>
-            </a:r>
-            <a:r>
-              <a:rPr lang="nl-NL" sz="900" dirty="0" smtClean="0"/>
-              <a:t> </a:t>
-            </a:r>
-            <a:r>
-              <a:rPr lang="nl-NL" sz="900" dirty="0" err="1" smtClean="0"/>
-              <a:t>inference</a:t>
-            </a:r>
-            <a:r>
-              <a:rPr lang="nl-NL" sz="900" dirty="0" smtClean="0"/>
-              <a:t> program </a:t>
-            </a:r>
-            <a:r>
-              <a:rPr lang="nl-NL" sz="900" dirty="0" err="1" smtClean="0"/>
-              <a:t>based</a:t>
-            </a:r>
-            <a:r>
-              <a:rPr lang="nl-NL" sz="900" dirty="0" smtClean="0"/>
-              <a:t> on BD, </a:t>
-            </a:r>
-            <a:r>
-              <a:rPr lang="nl-NL" sz="900" dirty="0" err="1" smtClean="0"/>
-              <a:t>can</a:t>
-            </a:r>
-            <a:r>
-              <a:rPr lang="nl-NL" sz="900" dirty="0" smtClean="0"/>
-              <a:t> </a:t>
-            </a:r>
-            <a:r>
-              <a:rPr lang="nl-NL" sz="900" dirty="0" err="1" smtClean="0"/>
-              <a:t>accurately</a:t>
-            </a:r>
-            <a:r>
-              <a:rPr lang="nl-NL" sz="900" dirty="0" smtClean="0"/>
-              <a:t> </a:t>
-            </a:r>
-            <a:r>
-              <a:rPr lang="nl-NL" sz="900" dirty="0" err="1" smtClean="0"/>
-              <a:t>recover</a:t>
-            </a:r>
-            <a:r>
-              <a:rPr lang="nl-NL" sz="900" dirty="0"/>
-              <a:t> </a:t>
-            </a:r>
-            <a:r>
-              <a:rPr lang="nl-NL" sz="900" dirty="0" smtClean="0"/>
-              <a:t>trees </a:t>
-            </a:r>
-            <a:r>
-              <a:rPr lang="nl-NL" sz="900" dirty="0" err="1" smtClean="0"/>
-              <a:t>that</a:t>
-            </a:r>
-            <a:r>
-              <a:rPr lang="nl-NL" sz="900" dirty="0" smtClean="0"/>
-              <a:t> </a:t>
-            </a:r>
-            <a:r>
-              <a:rPr lang="nl-NL" sz="900" dirty="0" err="1" smtClean="0"/>
-              <a:t>were</a:t>
-            </a:r>
-            <a:r>
-              <a:rPr lang="nl-NL" sz="900" dirty="0" smtClean="0"/>
-              <a:t> </a:t>
-            </a:r>
-            <a:r>
-              <a:rPr lang="nl-NL" sz="900" dirty="0" err="1" smtClean="0"/>
-              <a:t>simulated</a:t>
-            </a:r>
-            <a:r>
-              <a:rPr lang="nl-NL" sz="900" dirty="0" smtClean="0"/>
-              <a:t> </a:t>
-            </a:r>
-            <a:r>
-              <a:rPr lang="nl-NL" sz="900" dirty="0" err="1" smtClean="0"/>
-              <a:t>using</a:t>
-            </a:r>
-            <a:r>
-              <a:rPr lang="nl-NL" sz="900" dirty="0" smtClean="0"/>
-              <a:t> </a:t>
-            </a:r>
-            <a:r>
-              <a:rPr lang="nl-NL" sz="900" dirty="0" err="1" smtClean="0"/>
-              <a:t>the</a:t>
-            </a:r>
-            <a:r>
-              <a:rPr lang="nl-NL" sz="900" dirty="0" smtClean="0"/>
-              <a:t> </a:t>
-            </a:r>
-            <a:r>
-              <a:rPr lang="nl-NL" sz="900" dirty="0" err="1" smtClean="0"/>
-              <a:t>assumptions</a:t>
-            </a:r>
-            <a:r>
-              <a:rPr lang="nl-NL" sz="900" dirty="0" smtClean="0"/>
-              <a:t> of PBD.</a:t>
-            </a:r>
-            <a:r>
-              <a:rPr lang="nl-NL" sz="900" dirty="0" smtClean="0"/>
-              <a:t> </a:t>
-            </a:r>
-            <a:endParaRPr lang="nl-NL" sz="900" dirty="0" smtClean="0"/>
+            <a:r>
+              <a:rPr lang="en-GB" sz="900" dirty="0"/>
+              <a:t>In nature, speciation takes time. Despite this, many phylogenetic inference programs, like BEAST2 use models that assume speciation to happen instantly. One of those models is the pure Birth-Death model (BD), which predicts an increase in lineages over time at a constant rate.  However,  experimental data show a slowdown in lineage accumulation towards the present, contrary to the assumptions of BD. An extension of this model, the Protracted BD model (PBD), allows for speciation to take time, adding an incipient stage before a species becomes a good species. The effect this </a:t>
+            </a:r>
+            <a:r>
+              <a:rPr lang="en-GB" sz="900" dirty="0" err="1"/>
+              <a:t>protractednes</a:t>
+            </a:r>
+            <a:r>
+              <a:rPr lang="en-GB" sz="900" dirty="0"/>
+              <a:t> has on reconstructing phylogenies is currently unknown.  In this research, we test if BEAST2, a popular phylogenetic inference program based on BD, can accurately recover trees that were simulated using the assumptions of PBD.</a:t>
+            </a:r>
           </a:p>
           <a:p>
             <a:pPr algn="just"/>
@@ -3620,84 +3526,6 @@
       <p:pic>
         <p:nvPicPr>
           <p:cNvPr id="13" name="Picture 2" descr="C:\Users\Aline\Dropbox\RUG 2015-2016\1.9 Community eclogy research\4. Poster_presentation\Photo's\Pure BD and protracted BD visualized.png"/>
-          <p:cNvPicPr>
-            <a:picLocks noChangeAspect="1" noChangeArrowheads="1"/>
-          </p:cNvPicPr>
-          <p:nvPr/>
-        </p:nvPicPr>
-        <p:blipFill>
-          <a:blip r:embed="rId2" cstate="print"/>
-          <a:srcRect/>
-          <a:stretch>
-            <a:fillRect/>
-          </a:stretch>
-        </p:blipFill>
-        <p:spPr bwMode="auto">
-          <a:xfrm>
-            <a:off x="5868863" y="1242244"/>
-            <a:ext cx="1572319" cy="1270107"/>
-          </a:xfrm>
-          <a:prstGeom prst="rect">
-            <a:avLst/>
-          </a:prstGeom>
-          <a:noFill/>
-        </p:spPr>
-      </p:pic>
-      <p:pic>
-        <p:nvPicPr>
-          <p:cNvPr id="14" name="Picture 2" descr="C:\Users\Aline\Dropbox\RUG 2015-2016\1.9 Community eclogy research\4. Poster_presentation\Photo's\Parameter file example.png"/>
-          <p:cNvPicPr>
-            <a:picLocks noChangeAspect="1" noChangeArrowheads="1"/>
-          </p:cNvPicPr>
-          <p:nvPr/>
-        </p:nvPicPr>
-        <p:blipFill>
-          <a:blip r:embed="rId3" cstate="print"/>
-          <a:srcRect/>
-          <a:stretch>
-            <a:fillRect/>
-          </a:stretch>
-        </p:blipFill>
-        <p:spPr bwMode="auto">
-          <a:xfrm>
-            <a:off x="108223" y="3186460"/>
-            <a:ext cx="1600779" cy="1659899"/>
-          </a:xfrm>
-          <a:prstGeom prst="rect">
-            <a:avLst/>
-          </a:prstGeom>
-          <a:noFill/>
-        </p:spPr>
-      </p:pic>
-      <p:pic>
-        <p:nvPicPr>
-          <p:cNvPr id="15" name="Picture 2" descr="C:\Users\Aline\Dropbox\RUG 2015-2016\1.9 Community eclogy research\4. Poster_presentation\Figs and graphs ppt\Step1_Incipient species tree.png"/>
-          <p:cNvPicPr>
-            <a:picLocks noChangeAspect="1" noChangeArrowheads="1"/>
-          </p:cNvPicPr>
-          <p:nvPr/>
-        </p:nvPicPr>
-        <p:blipFill>
-          <a:blip r:embed="rId4" cstate="print"/>
-          <a:srcRect/>
-          <a:stretch>
-            <a:fillRect/>
-          </a:stretch>
-        </p:blipFill>
-        <p:spPr bwMode="auto">
-          <a:xfrm>
-            <a:off x="108223" y="4986660"/>
-            <a:ext cx="1584176" cy="1584176"/>
-          </a:xfrm>
-          <a:prstGeom prst="rect">
-            <a:avLst/>
-          </a:prstGeom>
-          <a:noFill/>
-        </p:spPr>
-      </p:pic>
-      <p:pic>
-        <p:nvPicPr>
-          <p:cNvPr id="16" name="Picture 3" descr="C:\Users\Aline\Dropbox\RUG 2015-2016\1.9 Community eclogy research\4. Poster_presentation\Figs and graphs ppt\Step2_Sampled species tree.png"/>
           <p:cNvPicPr>
             <a:picLocks noChangeAspect="1" noChangeArrowheads="1"/>
           </p:cNvPicPr>
@@ -3712,8 +3540,8 @@
         </p:blipFill>
         <p:spPr bwMode="auto">
           <a:xfrm>
-            <a:off x="324247" y="6714852"/>
-            <a:ext cx="1129890" cy="792088"/>
+            <a:off x="5724847" y="1242244"/>
+            <a:ext cx="1572319" cy="1270107"/>
           </a:xfrm>
           <a:prstGeom prst="rect">
             <a:avLst/>
@@ -3723,7 +3551,7 @@
       </p:pic>
       <p:pic>
         <p:nvPicPr>
-          <p:cNvPr id="17" name="Picture 4" descr="C:\Users\Aline\Dropbox\RUG 2015-2016\1.9 Community eclogy research\4. Poster_presentation\Figs and graphs ppt\Step3_Alignment.png"/>
+          <p:cNvPr id="14" name="Picture 2" descr="C:\Users\Aline\Dropbox\RUG 2015-2016\1.9 Community eclogy research\4. Poster_presentation\Photo's\Parameter file example.png"/>
           <p:cNvPicPr>
             <a:picLocks noChangeAspect="1" noChangeArrowheads="1"/>
           </p:cNvPicPr>
@@ -3738,8 +3566,8 @@
         </p:blipFill>
         <p:spPr bwMode="auto">
           <a:xfrm>
-            <a:off x="108223" y="7650956"/>
-            <a:ext cx="1557489" cy="1152128"/>
+            <a:off x="108223" y="3186460"/>
+            <a:ext cx="1600779" cy="1659899"/>
           </a:xfrm>
           <a:prstGeom prst="rect">
             <a:avLst/>
@@ -3749,25 +3577,23 @@
       </p:pic>
       <p:pic>
         <p:nvPicPr>
-          <p:cNvPr id="18" name="Picture 5" descr="C:\Users\Aline\Dropbox\RUG 2015-2016\1.9 Community eclogy research\4. Poster_presentation\Figs and graphs ppt\Step4_Posterior.png"/>
+          <p:cNvPr id="15" name="Picture 2" descr="C:\Users\Aline\Dropbox\RUG 2015-2016\1.9 Community eclogy research\4. Poster_presentation\Figs and graphs ppt\Step1_Incipient species tree.png"/>
           <p:cNvPicPr>
             <a:picLocks noChangeAspect="1" noChangeArrowheads="1"/>
           </p:cNvPicPr>
           <p:nvPr/>
         </p:nvPicPr>
         <p:blipFill>
-          <a:blip r:embed="rId7" cstate="print">
-            <a:lum bright="-50000" contrast="70000"/>
-          </a:blip>
-          <a:srcRect l="5463" t="18399" r="4187" b="3572"/>
+          <a:blip r:embed="rId7" cstate="print"/>
+          <a:srcRect/>
           <a:stretch>
             <a:fillRect/>
           </a:stretch>
         </p:blipFill>
         <p:spPr bwMode="auto">
           <a:xfrm>
-            <a:off x="659" y="8977943"/>
-            <a:ext cx="1736852" cy="1500009"/>
+            <a:off x="108223" y="4986660"/>
+            <a:ext cx="1584176" cy="1584176"/>
           </a:xfrm>
           <a:prstGeom prst="rect">
             <a:avLst/>
@@ -3775,77 +3601,9 @@
           <a:noFill/>
         </p:spPr>
       </p:pic>
-      <p:sp>
-        <p:nvSpPr>
-          <p:cNvPr id="19" name="TextBox 18"/>
-          <p:cNvSpPr txBox="1"/>
-          <p:nvPr/>
-        </p:nvSpPr>
-        <p:spPr>
-          <a:xfrm>
-            <a:off x="1715322" y="3186460"/>
-            <a:ext cx="1129205" cy="507831"/>
-          </a:xfrm>
-          <a:prstGeom prst="rect">
-            <a:avLst/>
-          </a:prstGeom>
-          <a:noFill/>
-        </p:spPr>
-        <p:txBody>
-          <a:bodyPr wrap="square" rtlCol="0">
-            <a:spAutoFit/>
-          </a:bodyPr>
-          <a:lstStyle/>
-          <a:p>
-            <a:r>
-              <a:rPr lang="nl-NL" sz="900" b="1" dirty="0" smtClean="0"/>
-              <a:t>Step 1</a:t>
-            </a:r>
-            <a:r>
-              <a:rPr lang="nl-NL" sz="900" dirty="0" smtClean="0"/>
-              <a:t>: Simulate desired parameter files</a:t>
-            </a:r>
-            <a:endParaRPr lang="en-GB" sz="900" dirty="0"/>
-          </a:p>
-        </p:txBody>
-      </p:sp>
-      <p:sp>
-        <p:nvSpPr>
-          <p:cNvPr id="20" name="TextBox 19"/>
-          <p:cNvSpPr txBox="1"/>
-          <p:nvPr/>
-        </p:nvSpPr>
-        <p:spPr>
-          <a:xfrm>
-            <a:off x="1764408" y="4980991"/>
-            <a:ext cx="1080119" cy="646331"/>
-          </a:xfrm>
-          <a:prstGeom prst="rect">
-            <a:avLst/>
-          </a:prstGeom>
-          <a:noFill/>
-        </p:spPr>
-        <p:txBody>
-          <a:bodyPr wrap="square" rtlCol="0">
-            <a:spAutoFit/>
-          </a:bodyPr>
-          <a:lstStyle/>
-          <a:p>
-            <a:r>
-              <a:rPr lang="nl-NL" sz="900" b="1" dirty="0" smtClean="0"/>
-              <a:t>Step 2</a:t>
-            </a:r>
-            <a:r>
-              <a:rPr lang="nl-NL" sz="900" dirty="0" smtClean="0"/>
-              <a:t>: Simulate 1 incipient species tree per parameter file</a:t>
-            </a:r>
-            <a:endParaRPr lang="en-GB" sz="900" dirty="0"/>
-          </a:p>
-        </p:txBody>
-      </p:sp>
       <p:pic>
         <p:nvPicPr>
-          <p:cNvPr id="21" name="Picture 5" descr="beast.png"/>
+          <p:cNvPr id="16" name="Picture 3" descr="C:\Users\Aline\Dropbox\RUG 2015-2016\1.9 Community eclogy research\4. Poster_presentation\Figs and graphs ppt\Step2_Sampled species tree.png"/>
           <p:cNvPicPr>
             <a:picLocks noChangeAspect="1" noChangeArrowheads="1"/>
           </p:cNvPicPr>
@@ -3859,9 +3617,9 @@
           </a:stretch>
         </p:blipFill>
         <p:spPr bwMode="auto">
-          <a:xfrm rot="20432816">
-            <a:off x="64731" y="8799513"/>
-            <a:ext cx="407458" cy="407459"/>
+          <a:xfrm>
+            <a:off x="324247" y="6714852"/>
+            <a:ext cx="1129890" cy="792088"/>
           </a:xfrm>
           <a:prstGeom prst="rect">
             <a:avLst/>
@@ -3869,104 +3627,70 @@
           <a:noFill/>
         </p:spPr>
       </p:pic>
-      <p:sp>
-        <p:nvSpPr>
-          <p:cNvPr id="22" name="TextBox 21"/>
-          <p:cNvSpPr txBox="1"/>
+      <p:pic>
+        <p:nvPicPr>
+          <p:cNvPr id="17" name="Picture 4" descr="C:\Users\Aline\Dropbox\RUG 2015-2016\1.9 Community eclogy research\4. Poster_presentation\Figs and graphs ppt\Step3_Alignment.png"/>
+          <p:cNvPicPr>
+            <a:picLocks noChangeAspect="1" noChangeArrowheads="1"/>
+          </p:cNvPicPr>
           <p:nvPr/>
-        </p:nvSpPr>
-        <p:spPr>
-          <a:xfrm>
-            <a:off x="1737512" y="6618129"/>
-            <a:ext cx="1107015" cy="646331"/>
+        </p:nvPicPr>
+        <p:blipFill>
+          <a:blip r:embed="rId9" cstate="print"/>
+          <a:srcRect/>
+          <a:stretch>
+            <a:fillRect/>
+          </a:stretch>
+        </p:blipFill>
+        <p:spPr bwMode="auto">
+          <a:xfrm>
+            <a:off x="108223" y="7650956"/>
+            <a:ext cx="1557489" cy="1152128"/>
           </a:xfrm>
           <a:prstGeom prst="rect">
             <a:avLst/>
           </a:prstGeom>
           <a:noFill/>
         </p:spPr>
-        <p:txBody>
-          <a:bodyPr wrap="square" rtlCol="0">
-            <a:spAutoFit/>
-          </a:bodyPr>
-          <a:lstStyle/>
-          <a:p>
-            <a:r>
-              <a:rPr lang="nl-NL" sz="900" b="1" dirty="0" smtClean="0"/>
-              <a:t>Step 3</a:t>
-            </a:r>
-            <a:r>
-              <a:rPr lang="nl-NL" sz="900" dirty="0" smtClean="0"/>
-              <a:t>: Sample 2 monophyletic species trees per incipient tree</a:t>
-            </a:r>
-            <a:endParaRPr lang="en-GB" sz="900" dirty="0"/>
-          </a:p>
-        </p:txBody>
-      </p:sp>
-      <p:sp>
-        <p:nvSpPr>
-          <p:cNvPr id="23" name="TextBox 22"/>
-          <p:cNvSpPr txBox="1"/>
+      </p:pic>
+      <p:pic>
+        <p:nvPicPr>
+          <p:cNvPr id="18" name="Picture 5" descr="C:\Users\Aline\Dropbox\RUG 2015-2016\1.9 Community eclogy research\4. Poster_presentation\Figs and graphs ppt\Step4_Posterior.png"/>
+          <p:cNvPicPr>
+            <a:picLocks noChangeAspect="1" noChangeArrowheads="1"/>
+          </p:cNvPicPr>
           <p:nvPr/>
-        </p:nvSpPr>
-        <p:spPr>
-          <a:xfrm>
-            <a:off x="2952749" y="9739188"/>
-            <a:ext cx="4608515" cy="338554"/>
+        </p:nvPicPr>
+        <p:blipFill>
+          <a:blip r:embed="rId10" cstate="print">
+            <a:lum bright="-50000" contrast="70000"/>
+          </a:blip>
+          <a:srcRect l="5463" t="18399" r="4187" b="3572"/>
+          <a:stretch>
+            <a:fillRect/>
+          </a:stretch>
+        </p:blipFill>
+        <p:spPr bwMode="auto">
+          <a:xfrm>
+            <a:off x="94133" y="9001873"/>
+            <a:ext cx="1584177" cy="1368153"/>
           </a:xfrm>
           <a:prstGeom prst="rect">
             <a:avLst/>
           </a:prstGeom>
           <a:noFill/>
         </p:spPr>
-        <p:txBody>
-          <a:bodyPr wrap="square" rtlCol="0">
-            <a:spAutoFit/>
-          </a:bodyPr>
-          <a:lstStyle/>
-          <a:p>
-            <a:r>
-              <a:rPr lang="en-GB" sz="800" dirty="0" smtClean="0"/>
-              <a:t>Etienne, R. S., &amp; </a:t>
-            </a:r>
-            <a:r>
-              <a:rPr lang="en-GB" sz="800" dirty="0" err="1" smtClean="0"/>
-              <a:t>Rosindell</a:t>
-            </a:r>
-            <a:r>
-              <a:rPr lang="en-GB" sz="800" dirty="0" smtClean="0"/>
-              <a:t>, J. (2012). Prolonging the past counteracts the pull of the present: protracted speciation can explain observed slowdowns in diversification. </a:t>
-            </a:r>
-            <a:r>
-              <a:rPr lang="en-GB" sz="800" i="1" dirty="0" smtClean="0"/>
-              <a:t>Systematic Biology</a:t>
-            </a:r>
-            <a:r>
-              <a:rPr lang="en-GB" sz="800" dirty="0" smtClean="0"/>
-              <a:t>, </a:t>
-            </a:r>
-            <a:r>
-              <a:rPr lang="en-GB" sz="800" b="1" dirty="0" smtClean="0"/>
-              <a:t>61(2</a:t>
-            </a:r>
-            <a:r>
-              <a:rPr lang="en-GB" sz="800" dirty="0" smtClean="0"/>
-              <a:t>), 204-213.</a:t>
-            </a:r>
-            <a:endParaRPr lang="en-GB" sz="800" dirty="0"/>
-          </a:p>
-        </p:txBody>
-      </p:sp>
-      <p:sp>
-        <p:nvSpPr>
-          <p:cNvPr id="24" name="TextBox 23"/>
+      </p:pic>
+      <p:sp>
+        <p:nvSpPr>
+          <p:cNvPr id="19" name="TextBox 18"/>
           <p:cNvSpPr txBox="1"/>
           <p:nvPr/>
         </p:nvSpPr>
         <p:spPr>
           <a:xfrm>
-            <a:off x="1737511" y="7650956"/>
-            <a:ext cx="1107016" cy="646331"/>
+            <a:off x="1692399" y="3183954"/>
+            <a:ext cx="1083006" cy="507831"/>
           </a:xfrm>
           <a:prstGeom prst="rect">
             <a:avLst/>
@@ -3981,11 +3705,11 @@
           <a:p>
             <a:r>
               <a:rPr lang="nl-NL" sz="900" b="1" dirty="0" smtClean="0"/>
-              <a:t>Step 4</a:t>
+              <a:t>Step 1</a:t>
             </a:r>
             <a:r>
               <a:rPr lang="nl-NL" sz="900" dirty="0" smtClean="0"/>
-              <a:t>: Simulat 2 DNA alignments per sampled species tree</a:t>
+              <a:t>: Simulate desired parameter files</a:t>
             </a:r>
             <a:endParaRPr lang="en-GB" sz="900" dirty="0"/>
           </a:p>
@@ -3993,14 +3717,14 @@
       </p:sp>
       <p:sp>
         <p:nvSpPr>
-          <p:cNvPr id="25" name="TextBox 24"/>
+          <p:cNvPr id="20" name="TextBox 19"/>
           <p:cNvSpPr txBox="1"/>
           <p:nvPr/>
         </p:nvSpPr>
         <p:spPr>
           <a:xfrm>
-            <a:off x="1770337" y="8964428"/>
-            <a:ext cx="1074190" cy="923330"/>
+            <a:off x="1700306" y="4986660"/>
+            <a:ext cx="1075099" cy="646331"/>
           </a:xfrm>
           <a:prstGeom prst="rect">
             <a:avLst/>
@@ -4015,6 +3739,188 @@
           <a:p>
             <a:r>
               <a:rPr lang="nl-NL" sz="900" b="1" dirty="0" smtClean="0"/>
+              <a:t>Step 2</a:t>
+            </a:r>
+            <a:r>
+              <a:rPr lang="nl-NL" sz="900" dirty="0" smtClean="0"/>
+              <a:t>: Simulate 1 incipient species tree per parameter file</a:t>
+            </a:r>
+            <a:endParaRPr lang="en-GB" sz="900" dirty="0"/>
+          </a:p>
+        </p:txBody>
+      </p:sp>
+      <p:pic>
+        <p:nvPicPr>
+          <p:cNvPr id="21" name="Picture 5" descr="beast.png"/>
+          <p:cNvPicPr>
+            <a:picLocks noChangeAspect="1" noChangeArrowheads="1"/>
+          </p:cNvPicPr>
+          <p:nvPr/>
+        </p:nvPicPr>
+        <p:blipFill>
+          <a:blip r:embed="rId11" cstate="print"/>
+          <a:srcRect/>
+          <a:stretch>
+            <a:fillRect/>
+          </a:stretch>
+        </p:blipFill>
+        <p:spPr bwMode="auto">
+          <a:xfrm rot="20432816">
+            <a:off x="50640" y="8782625"/>
+            <a:ext cx="407458" cy="407459"/>
+          </a:xfrm>
+          <a:prstGeom prst="rect">
+            <a:avLst/>
+          </a:prstGeom>
+          <a:noFill/>
+        </p:spPr>
+      </p:pic>
+      <p:sp>
+        <p:nvSpPr>
+          <p:cNvPr id="22" name="TextBox 21"/>
+          <p:cNvSpPr txBox="1"/>
+          <p:nvPr/>
+        </p:nvSpPr>
+        <p:spPr>
+          <a:xfrm>
+            <a:off x="1700306" y="6671443"/>
+            <a:ext cx="1075100" cy="646331"/>
+          </a:xfrm>
+          <a:prstGeom prst="rect">
+            <a:avLst/>
+          </a:prstGeom>
+          <a:noFill/>
+        </p:spPr>
+        <p:txBody>
+          <a:bodyPr wrap="square" rtlCol="0">
+            <a:spAutoFit/>
+          </a:bodyPr>
+          <a:lstStyle/>
+          <a:p>
+            <a:r>
+              <a:rPr lang="nl-NL" sz="900" b="1" dirty="0" smtClean="0"/>
+              <a:t>Step 3</a:t>
+            </a:r>
+            <a:r>
+              <a:rPr lang="nl-NL" sz="900" dirty="0" smtClean="0"/>
+              <a:t>: Sample 2 monophyletic species trees per incipient tree</a:t>
+            </a:r>
+            <a:endParaRPr lang="en-GB" sz="900" dirty="0"/>
+          </a:p>
+        </p:txBody>
+      </p:sp>
+      <p:sp>
+        <p:nvSpPr>
+          <p:cNvPr id="23" name="TextBox 22"/>
+          <p:cNvSpPr txBox="1"/>
+          <p:nvPr/>
+        </p:nvSpPr>
+        <p:spPr>
+          <a:xfrm>
+            <a:off x="2834116" y="9605156"/>
+            <a:ext cx="4716739" cy="338554"/>
+          </a:xfrm>
+          <a:prstGeom prst="rect">
+            <a:avLst/>
+          </a:prstGeom>
+          <a:noFill/>
+        </p:spPr>
+        <p:txBody>
+          <a:bodyPr wrap="square" rtlCol="0">
+            <a:spAutoFit/>
+          </a:bodyPr>
+          <a:lstStyle/>
+          <a:p>
+            <a:r>
+              <a:rPr lang="en-GB" sz="800" dirty="0" smtClean="0"/>
+              <a:t>Etienne, R. S., &amp; </a:t>
+            </a:r>
+            <a:r>
+              <a:rPr lang="en-GB" sz="800" dirty="0" err="1" smtClean="0"/>
+              <a:t>Rosindell</a:t>
+            </a:r>
+            <a:r>
+              <a:rPr lang="en-GB" sz="800" dirty="0" smtClean="0"/>
+              <a:t>, J. (2012). Prolonging the past counteracts the pull of the present: protracted speciation can explain observed slowdowns in diversification. </a:t>
+            </a:r>
+            <a:r>
+              <a:rPr lang="en-GB" sz="800" i="1" dirty="0" smtClean="0"/>
+              <a:t>Systematic Biology</a:t>
+            </a:r>
+            <a:r>
+              <a:rPr lang="en-GB" sz="800" dirty="0" smtClean="0"/>
+              <a:t>, </a:t>
+            </a:r>
+            <a:r>
+              <a:rPr lang="en-GB" sz="800" b="1" dirty="0" smtClean="0"/>
+              <a:t>61(2</a:t>
+            </a:r>
+            <a:r>
+              <a:rPr lang="en-GB" sz="800" dirty="0" smtClean="0"/>
+              <a:t>), 204-213.</a:t>
+            </a:r>
+            <a:endParaRPr lang="en-GB" sz="800" dirty="0"/>
+          </a:p>
+        </p:txBody>
+      </p:sp>
+      <p:sp>
+        <p:nvSpPr>
+          <p:cNvPr id="24" name="TextBox 23"/>
+          <p:cNvSpPr txBox="1"/>
+          <p:nvPr/>
+        </p:nvSpPr>
+        <p:spPr>
+          <a:xfrm>
+            <a:off x="1692399" y="7679495"/>
+            <a:ext cx="1083006" cy="646331"/>
+          </a:xfrm>
+          <a:prstGeom prst="rect">
+            <a:avLst/>
+          </a:prstGeom>
+          <a:noFill/>
+        </p:spPr>
+        <p:txBody>
+          <a:bodyPr wrap="square" rtlCol="0">
+            <a:spAutoFit/>
+          </a:bodyPr>
+          <a:lstStyle/>
+          <a:p>
+            <a:r>
+              <a:rPr lang="nl-NL" sz="900" b="1" dirty="0" smtClean="0"/>
+              <a:t>Step 4</a:t>
+            </a:r>
+            <a:r>
+              <a:rPr lang="nl-NL" sz="900" dirty="0" smtClean="0"/>
+              <a:t>: Simulat 2 DNA alignments per sampled species tree</a:t>
+            </a:r>
+            <a:endParaRPr lang="en-GB" sz="900" dirty="0"/>
+          </a:p>
+        </p:txBody>
+      </p:sp>
+      <p:sp>
+        <p:nvSpPr>
+          <p:cNvPr id="25" name="TextBox 24"/>
+          <p:cNvSpPr txBox="1"/>
+          <p:nvPr/>
+        </p:nvSpPr>
+        <p:spPr>
+          <a:xfrm>
+            <a:off x="1695285" y="8898077"/>
+            <a:ext cx="1080120" cy="923330"/>
+          </a:xfrm>
+          <a:prstGeom prst="rect">
+            <a:avLst/>
+          </a:prstGeom>
+          <a:noFill/>
+        </p:spPr>
+        <p:txBody>
+          <a:bodyPr wrap="square" rtlCol="0">
+            <a:spAutoFit/>
+          </a:bodyPr>
+          <a:lstStyle/>
+          <a:p>
+            <a:r>
+              <a:rPr lang="nl-NL" sz="900" b="1" dirty="0" smtClean="0"/>
               <a:t>Step 5</a:t>
             </a:r>
             <a:r>
@@ -4033,12 +3939,18 @@
         </p:nvSpPr>
         <p:spPr>
           <a:xfrm>
-            <a:off x="0" y="2754412"/>
-            <a:ext cx="2844527" cy="279648"/>
+            <a:off x="1" y="2754412"/>
+            <a:ext cx="2775404" cy="279648"/>
           </a:xfrm>
           <a:prstGeom prst="rect">
             <a:avLst/>
           </a:prstGeom>
+          <a:noFill/>
+          <a:ln>
+            <a:solidFill>
+              <a:srgbClr val="4E2D12"/>
+            </a:solidFill>
+          </a:ln>
         </p:spPr>
         <p:style>
           <a:lnRef idx="2">
@@ -4062,10 +3974,18 @@
           <a:p>
             <a:pPr algn="ctr"/>
             <a:r>
-              <a:rPr lang="en-GB" sz="1400" dirty="0" smtClean="0"/>
+              <a:rPr lang="en-GB" sz="1400" dirty="0" smtClean="0">
+                <a:solidFill>
+                  <a:srgbClr val="492303"/>
+                </a:solidFill>
+              </a:rPr>
               <a:t>Method</a:t>
             </a:r>
-            <a:endParaRPr lang="en-GB" sz="1400" dirty="0"/>
+            <a:endParaRPr lang="en-GB" sz="1400" dirty="0">
+              <a:solidFill>
+                <a:srgbClr val="492303"/>
+              </a:solidFill>
+            </a:endParaRPr>
           </a:p>
         </p:txBody>
       </p:sp>
@@ -4077,12 +3997,18 @@
         </p:nvSpPr>
         <p:spPr>
           <a:xfrm>
-            <a:off x="2877353" y="2754412"/>
-            <a:ext cx="4683910" cy="288032"/>
+            <a:off x="2844528" y="2754412"/>
+            <a:ext cx="4716735" cy="288032"/>
           </a:xfrm>
           <a:prstGeom prst="rect">
             <a:avLst/>
           </a:prstGeom>
+          <a:noFill/>
+          <a:ln>
+            <a:solidFill>
+              <a:srgbClr val="4E2D12"/>
+            </a:solidFill>
+          </a:ln>
         </p:spPr>
         <p:style>
           <a:lnRef idx="2">
@@ -4106,10 +4032,18 @@
           <a:p>
             <a:pPr algn="ctr"/>
             <a:r>
-              <a:rPr lang="en-GB" sz="1400" dirty="0" smtClean="0"/>
+              <a:rPr lang="en-GB" sz="1400" dirty="0" smtClean="0">
+                <a:solidFill>
+                  <a:srgbClr val="492303"/>
+                </a:solidFill>
+              </a:rPr>
               <a:t>Results</a:t>
             </a:r>
-            <a:endParaRPr lang="en-GB" dirty="0"/>
+            <a:endParaRPr lang="en-GB" dirty="0">
+              <a:solidFill>
+                <a:srgbClr val="492303"/>
+              </a:solidFill>
+            </a:endParaRPr>
           </a:p>
         </p:txBody>
       </p:sp>
@@ -4121,12 +4055,18 @@
         </p:nvSpPr>
         <p:spPr>
           <a:xfrm>
-            <a:off x="2877353" y="9307140"/>
-            <a:ext cx="4683910" cy="288032"/>
+            <a:off x="2844528" y="9307140"/>
+            <a:ext cx="4716736" cy="298016"/>
           </a:xfrm>
           <a:prstGeom prst="rect">
             <a:avLst/>
           </a:prstGeom>
+          <a:noFill/>
+          <a:ln>
+            <a:solidFill>
+              <a:srgbClr val="4E2D12"/>
+            </a:solidFill>
+          </a:ln>
         </p:spPr>
         <p:style>
           <a:lnRef idx="2">
@@ -4150,10 +4090,18 @@
           <a:p>
             <a:pPr algn="ctr"/>
             <a:r>
-              <a:rPr lang="en-GB" sz="1400" dirty="0" smtClean="0"/>
+              <a:rPr lang="en-GB" sz="1400" dirty="0" smtClean="0">
+                <a:solidFill>
+                  <a:srgbClr val="492303"/>
+                </a:solidFill>
+              </a:rPr>
               <a:t>References</a:t>
             </a:r>
-            <a:endParaRPr lang="en-GB" sz="1400" dirty="0"/>
+            <a:endParaRPr lang="en-GB" sz="1400" dirty="0">
+              <a:solidFill>
+                <a:srgbClr val="492303"/>
+              </a:solidFill>
+            </a:endParaRPr>
           </a:p>
         </p:txBody>
       </p:sp>
@@ -4165,7 +4113,7 @@
         </p:nvSpPr>
         <p:spPr>
           <a:xfrm>
-            <a:off x="5652839" y="2466380"/>
+            <a:off x="5580831" y="2466380"/>
             <a:ext cx="875928" cy="461665"/>
           </a:xfrm>
           <a:prstGeom prst="rect">
@@ -4207,7 +4155,7 @@
         </p:nvSpPr>
         <p:spPr>
           <a:xfrm>
-            <a:off x="6228903" y="2466380"/>
+            <a:off x="6084887" y="2466380"/>
             <a:ext cx="875928" cy="200055"/>
           </a:xfrm>
           <a:prstGeom prst="rect">
@@ -4238,7 +4186,7 @@
         </p:nvSpPr>
         <p:spPr>
           <a:xfrm>
-            <a:off x="6948983" y="2466380"/>
+            <a:off x="6732959" y="2466380"/>
             <a:ext cx="875928" cy="446276"/>
           </a:xfrm>
           <a:prstGeom prst="rect">
@@ -4272,7 +4220,7 @@
           <p:nvPr/>
         </p:nvPicPr>
         <p:blipFill>
-          <a:blip r:embed="rId9" cstate="print"/>
+          <a:blip r:embed="rId12" cstate="print"/>
           <a:srcRect/>
           <a:stretch>
             <a:fillRect/>
@@ -4280,7 +4228,7 @@
         </p:blipFill>
         <p:spPr bwMode="auto">
           <a:xfrm>
-            <a:off x="4284687" y="1242244"/>
+            <a:off x="4212679" y="1170236"/>
             <a:ext cx="1368152" cy="1320506"/>
           </a:xfrm>
           <a:prstGeom prst="rect">
@@ -4291,14 +4239,88 @@
       </p:pic>
       <p:pic>
         <p:nvPicPr>
-          <p:cNvPr id="2" name="Afbeelding 1"/>
+          <p:cNvPr id="1030" name="Picture 6"/>
+          <p:cNvPicPr>
+            <a:picLocks noChangeAspect="1" noChangeArrowheads="1"/>
+          </p:cNvPicPr>
+          <p:nvPr/>
+        </p:nvPicPr>
+        <p:blipFill>
+          <a:blip r:embed="rId13" cstate="print">
+            <a:lum bright="-23000"/>
+          </a:blip>
+          <a:srcRect/>
+          <a:stretch>
+            <a:fillRect/>
+          </a:stretch>
+        </p:blipFill>
+        <p:spPr bwMode="auto">
+          <a:xfrm>
+            <a:off x="108223" y="0"/>
+            <a:ext cx="1224136" cy="977609"/>
+          </a:xfrm>
+          <a:prstGeom prst="ellipse">
+            <a:avLst/>
+          </a:prstGeom>
+          <a:ln>
+            <a:noFill/>
+          </a:ln>
+          <a:effectLst>
+            <a:outerShdw sx="1000" sy="1000" algn="ctr" rotWithShape="0">
+              <a:srgbClr val="000000"/>
+            </a:outerShdw>
+            <a:softEdge rad="112500"/>
+          </a:effectLst>
+        </p:spPr>
+      </p:pic>
+      <p:sp>
+        <p:nvSpPr>
+          <p:cNvPr id="2" name="Rechthoek 1"/>
+          <p:cNvSpPr/>
+          <p:nvPr/>
+        </p:nvSpPr>
+        <p:spPr>
+          <a:xfrm>
+            <a:off x="4228109" y="6469607"/>
+            <a:ext cx="1949572" cy="307777"/>
+          </a:xfrm>
+          <a:prstGeom prst="rect">
+            <a:avLst/>
+          </a:prstGeom>
+        </p:spPr>
+        <p:txBody>
+          <a:bodyPr wrap="none">
+            <a:spAutoFit/>
+          </a:bodyPr>
+          <a:lstStyle/>
+          <a:p>
+            <a:pPr algn="ctr"/>
+            <a:r>
+              <a:rPr lang="en-GB" sz="1400" dirty="0" smtClean="0">
+                <a:solidFill>
+                  <a:srgbClr val="492303"/>
+                </a:solidFill>
+              </a:rPr>
+              <a:t>Discussion &amp; Conclusion</a:t>
+            </a:r>
+            <a:endParaRPr lang="en-GB" sz="1400" dirty="0">
+              <a:solidFill>
+                <a:srgbClr val="492303"/>
+              </a:solidFill>
+            </a:endParaRPr>
+          </a:p>
+        </p:txBody>
+      </p:sp>
+      <p:pic>
+        <p:nvPicPr>
+          <p:cNvPr id="3" name="Afbeelding 2"/>
           <p:cNvPicPr>
             <a:picLocks noChangeAspect="1"/>
           </p:cNvPicPr>
           <p:nvPr/>
         </p:nvPicPr>
         <p:blipFill>
-          <a:blip r:embed="rId10">
+          <a:blip r:embed="rId14">
             <a:extLst>
               <a:ext uri="{28A0092B-C50C-407E-A947-70E740481C1C}">
                 <a14:useLocalDpi xmlns:a14="http://schemas.microsoft.com/office/drawing/2010/main" val="0"/>
@@ -4311,61 +4333,56 @@
         </p:blipFill>
         <p:spPr>
           <a:xfrm>
-            <a:off x="2952749" y="3114783"/>
-            <a:ext cx="3391185" cy="1655852"/>
+            <a:off x="2955207" y="3065068"/>
+            <a:ext cx="2839299" cy="1725668"/>
           </a:xfrm>
           <a:prstGeom prst="rect">
             <a:avLst/>
           </a:prstGeom>
         </p:spPr>
       </p:pic>
-      <p:sp>
-        <p:nvSpPr>
-          <p:cNvPr id="5" name="Rechthoek 4"/>
-          <p:cNvSpPr/>
+      <p:pic>
+        <p:nvPicPr>
+          <p:cNvPr id="5" name="Afbeelding 4"/>
+          <p:cNvPicPr>
+            <a:picLocks noChangeAspect="1"/>
+          </p:cNvPicPr>
           <p:nvPr/>
-        </p:nvSpPr>
+        </p:nvPicPr>
+        <p:blipFill>
+          <a:blip r:embed="rId15">
+            <a:extLst>
+              <a:ext uri="{28A0092B-C50C-407E-A947-70E740481C1C}">
+                <a14:useLocalDpi xmlns:a14="http://schemas.microsoft.com/office/drawing/2010/main" val="0"/>
+              </a:ext>
+            </a:extLst>
+          </a:blip>
+          <a:stretch>
+            <a:fillRect/>
+          </a:stretch>
+        </p:blipFill>
         <p:spPr>
           <a:xfrm>
-            <a:off x="4244522" y="6467216"/>
-            <a:ext cx="1949572" cy="307777"/>
+            <a:off x="2951253" y="4859510"/>
+            <a:ext cx="2629578" cy="1598204"/>
           </a:xfrm>
           <a:prstGeom prst="rect">
             <a:avLst/>
           </a:prstGeom>
         </p:spPr>
-        <p:txBody>
-          <a:bodyPr wrap="none">
-            <a:spAutoFit/>
-          </a:bodyPr>
-          <a:lstStyle/>
-          <a:p>
-            <a:pPr algn="ctr"/>
-            <a:r>
-              <a:rPr lang="en-GB" sz="1400" dirty="0" smtClean="0">
-                <a:solidFill>
-                  <a:schemeClr val="accent1">
-                    <a:lumMod val="75000"/>
-                  </a:schemeClr>
-                </a:solidFill>
-              </a:rPr>
-              <a:t>Discussion &amp; Conclusion</a:t>
-            </a:r>
-            <a:endParaRPr lang="en-GB" sz="1400" dirty="0">
-              <a:solidFill>
-                <a:schemeClr val="accent1">
-                  <a:lumMod val="75000"/>
-                </a:schemeClr>
-              </a:solidFill>
-            </a:endParaRPr>
-          </a:p>
-        </p:txBody>
-      </p:sp>
+      </p:pic>
     </p:spTree>
   </p:cSld>
   <p:clrMapOvr>
     <a:masterClrMapping/>
   </p:clrMapOvr>
+  <p:timing>
+    <p:tnLst>
+      <p:par>
+        <p:cTn id="1" dur="indefinite" restart="never" nodeType="tmRoot"/>
+      </p:par>
+    </p:tnLst>
+  </p:timing>
 </p:sld>
 </file>
 

</xml_diff>

<commit_message>
most recent poster update in _femke version
</commit_message>
<xml_diff>
--- a/doc/poster_final_femke_deel.pptx
+++ b/doc/poster_final_femke_deel.pptx
@@ -3217,32 +3217,6 @@
           </a:ln>
         </p:spPr>
       </p:pic>
-      <p:pic>
-        <p:nvPicPr>
-          <p:cNvPr id="1029" name="Picture 5" descr="C:\Users\Aline\Downloads\dna-modified-tree-genetic-4433322.jpg"/>
-          <p:cNvPicPr>
-            <a:picLocks noChangeAspect="1" noChangeArrowheads="1"/>
-          </p:cNvPicPr>
-          <p:nvPr/>
-        </p:nvPicPr>
-        <p:blipFill>
-          <a:blip r:embed="rId4" cstate="print"/>
-          <a:srcRect/>
-          <a:stretch>
-            <a:fillRect/>
-          </a:stretch>
-        </p:blipFill>
-        <p:spPr bwMode="auto">
-          <a:xfrm>
-            <a:off x="5960091" y="4875255"/>
-            <a:ext cx="1030287" cy="1316037"/>
-          </a:xfrm>
-          <a:prstGeom prst="rect">
-            <a:avLst/>
-          </a:prstGeom>
-          <a:noFill/>
-        </p:spPr>
-      </p:pic>
       <p:sp>
         <p:nvSpPr>
           <p:cNvPr id="4" name="Rectangle 3"/>
@@ -3474,63 +3448,35 @@
           </a:p>
         </p:txBody>
       </p:sp>
-      <p:sp>
-        <p:nvSpPr>
-          <p:cNvPr id="11" name="TextBox 10"/>
-          <p:cNvSpPr txBox="1"/>
+      <p:pic>
+        <p:nvPicPr>
+          <p:cNvPr id="13" name="Picture 2" descr="C:\Users\Aline\Dropbox\RUG 2015-2016\1.9 Community eclogy research\4. Poster_presentation\Photo's\Pure BD and protracted BD visualized.png"/>
+          <p:cNvPicPr>
+            <a:picLocks noChangeAspect="1" noChangeArrowheads="1"/>
+          </p:cNvPicPr>
           <p:nvPr/>
-        </p:nvSpPr>
-        <p:spPr>
-          <a:xfrm>
-            <a:off x="1" y="1059632"/>
-            <a:ext cx="4538932" cy="1892826"/>
+        </p:nvPicPr>
+        <p:blipFill>
+          <a:blip r:embed="rId4" cstate="print"/>
+          <a:srcRect/>
+          <a:stretch>
+            <a:fillRect/>
+          </a:stretch>
+        </p:blipFill>
+        <p:spPr bwMode="auto">
+          <a:xfrm rot="5400000" flipV="1">
+            <a:off x="1463866" y="1258238"/>
+            <a:ext cx="1572319" cy="1270107"/>
           </a:xfrm>
           <a:prstGeom prst="rect">
             <a:avLst/>
           </a:prstGeom>
           <a:noFill/>
         </p:spPr>
-        <p:txBody>
-          <a:bodyPr wrap="square" rtlCol="0">
-            <a:spAutoFit/>
-          </a:bodyPr>
-          <a:lstStyle/>
-          <a:p>
-            <a:pPr algn="just"/>
-            <a:r>
-              <a:rPr lang="en-GB" sz="900" dirty="0"/>
-              <a:t>In nature, speciation takes time. Despite this, many phylogenetic inference programs, like BEAST2 use models that assume speciation to happen instantly. One of those models is the pure Birth-Death model (BD), which predicts an increase in lineages over time at a constant rate.  However,  experimental data show a slowdown in lineage accumulation towards the present, contrary to the assumptions of BD. An extension of this model, the Protracted BD model (PBD), allows for speciation to take time, adding an incipient stage before a species becomes a good species. The effect this </a:t>
-            </a:r>
-            <a:r>
-              <a:rPr lang="en-GB" sz="900" dirty="0" err="1" smtClean="0"/>
-              <a:t>protractedness</a:t>
-            </a:r>
-            <a:r>
-              <a:rPr lang="en-GB" sz="900" dirty="0" smtClean="0"/>
-              <a:t> </a:t>
-            </a:r>
-            <a:r>
-              <a:rPr lang="en-GB" sz="900" dirty="0"/>
-              <a:t>has on reconstructing phylogenies is currently unknown.  In this research, we test if BEAST2, a popular phylogenetic inference program based on BD, can accurately recover trees that were simulated using the assumptions of PBD.</a:t>
-            </a:r>
-          </a:p>
-          <a:p>
-            <a:pPr algn="just"/>
-            <a:endParaRPr lang="nl-NL" sz="900" dirty="0" smtClean="0"/>
-          </a:p>
-          <a:p>
-            <a:pPr algn="just"/>
-            <a:endParaRPr lang="nl-NL" sz="900" dirty="0"/>
-          </a:p>
-          <a:p>
-            <a:pPr algn="just"/>
-            <a:endParaRPr lang="en-GB" sz="900" dirty="0"/>
-          </a:p>
-        </p:txBody>
-      </p:sp>
+      </p:pic>
       <p:pic>
         <p:nvPicPr>
-          <p:cNvPr id="13" name="Picture 2" descr="C:\Users\Aline\Dropbox\RUG 2015-2016\1.9 Community eclogy research\4. Poster_presentation\Photo's\Pure BD and protracted BD visualized.png"/>
+          <p:cNvPr id="15" name="Picture 2" descr="C:\Users\Aline\Dropbox\RUG 2015-2016\1.9 Community eclogy research\4. Poster_presentation\Figs and graphs ppt\Step1_Incipient species tree.png"/>
           <p:cNvPicPr>
             <a:picLocks noChangeAspect="1" noChangeArrowheads="1"/>
           </p:cNvPicPr>
@@ -3545,8 +3491,8 @@
         </p:blipFill>
         <p:spPr bwMode="auto">
           <a:xfrm>
-            <a:off x="5724847" y="1242244"/>
-            <a:ext cx="1572319" cy="1270107"/>
+            <a:off x="179868" y="5013930"/>
+            <a:ext cx="1584176" cy="1584176"/>
           </a:xfrm>
           <a:prstGeom prst="rect">
             <a:avLst/>
@@ -3556,7 +3502,7 @@
       </p:pic>
       <p:pic>
         <p:nvPicPr>
-          <p:cNvPr id="15" name="Picture 2" descr="C:\Users\Aline\Dropbox\RUG 2015-2016\1.9 Community eclogy research\4. Poster_presentation\Figs and graphs ppt\Step1_Incipient species tree.png"/>
+          <p:cNvPr id="17" name="Picture 4" descr="C:\Users\Aline\Dropbox\RUG 2015-2016\1.9 Community eclogy research\4. Poster_presentation\Figs and graphs ppt\Step3_Alignment.png"/>
           <p:cNvPicPr>
             <a:picLocks noChangeAspect="1" noChangeArrowheads="1"/>
           </p:cNvPicPr>
@@ -3571,32 +3517,6 @@
         </p:blipFill>
         <p:spPr bwMode="auto">
           <a:xfrm>
-            <a:off x="179868" y="5013930"/>
-            <a:ext cx="1584176" cy="1584176"/>
-          </a:xfrm>
-          <a:prstGeom prst="rect">
-            <a:avLst/>
-          </a:prstGeom>
-          <a:noFill/>
-        </p:spPr>
-      </p:pic>
-      <p:pic>
-        <p:nvPicPr>
-          <p:cNvPr id="17" name="Picture 4" descr="C:\Users\Aline\Dropbox\RUG 2015-2016\1.9 Community eclogy research\4. Poster_presentation\Figs and graphs ppt\Step3_Alignment.png"/>
-          <p:cNvPicPr>
-            <a:picLocks noChangeAspect="1" noChangeArrowheads="1"/>
-          </p:cNvPicPr>
-          <p:nvPr/>
-        </p:nvPicPr>
-        <p:blipFill>
-          <a:blip r:embed="rId7" cstate="print"/>
-          <a:srcRect/>
-          <a:stretch>
-            <a:fillRect/>
-          </a:stretch>
-        </p:blipFill>
-        <p:spPr bwMode="auto">
-          <a:xfrm>
             <a:off x="108223" y="7650956"/>
             <a:ext cx="1557489" cy="1152128"/>
           </a:xfrm>
@@ -3615,7 +3535,7 @@
           <p:nvPr/>
         </p:nvPicPr>
         <p:blipFill>
-          <a:blip r:embed="rId8" cstate="print">
+          <a:blip r:embed="rId7" cstate="print">
             <a:lum bright="-50000" contrast="70000"/>
           </a:blip>
           <a:srcRect l="5463" t="18399" r="4187" b="3572"/>
@@ -3711,7 +3631,7 @@
           <p:nvPr/>
         </p:nvPicPr>
         <p:blipFill>
-          <a:blip r:embed="rId9" cstate="print"/>
+          <a:blip r:embed="rId8" cstate="print"/>
           <a:srcRect/>
           <a:stretch>
             <a:fillRect/>
@@ -4058,112 +3978,6 @@
           </a:p>
         </p:txBody>
       </p:sp>
-      <p:sp>
-        <p:nvSpPr>
-          <p:cNvPr id="32" name="TextBox 31"/>
-          <p:cNvSpPr txBox="1"/>
-          <p:nvPr/>
-        </p:nvSpPr>
-        <p:spPr>
-          <a:xfrm>
-            <a:off x="5580831" y="2466380"/>
-            <a:ext cx="875928" cy="461665"/>
-          </a:xfrm>
-          <a:prstGeom prst="rect">
-            <a:avLst/>
-          </a:prstGeom>
-          <a:noFill/>
-        </p:spPr>
-        <p:txBody>
-          <a:bodyPr wrap="square" rtlCol="0">
-            <a:spAutoFit/>
-          </a:bodyPr>
-          <a:lstStyle/>
-          <a:p>
-            <a:pPr algn="ctr"/>
-            <a:r>
-              <a:rPr lang="en-GB" sz="700" dirty="0" smtClean="0"/>
-              <a:t>PBD ( </a:t>
-            </a:r>
-            <a:r>
-              <a:rPr lang="el-GR" sz="700" dirty="0" smtClean="0"/>
-              <a:t>λ</a:t>
-            </a:r>
-            <a:r>
-              <a:rPr lang="en-GB" sz="700" dirty="0" smtClean="0"/>
-              <a:t> = ∞)</a:t>
-            </a:r>
-          </a:p>
-          <a:p>
-            <a:pPr algn="ctr"/>
-            <a:endParaRPr lang="en-GB" sz="1600" dirty="0"/>
-          </a:p>
-        </p:txBody>
-      </p:sp>
-      <p:sp>
-        <p:nvSpPr>
-          <p:cNvPr id="33" name="TextBox 32"/>
-          <p:cNvSpPr txBox="1"/>
-          <p:nvPr/>
-        </p:nvSpPr>
-        <p:spPr>
-          <a:xfrm>
-            <a:off x="6084887" y="2466380"/>
-            <a:ext cx="875928" cy="200055"/>
-          </a:xfrm>
-          <a:prstGeom prst="rect">
-            <a:avLst/>
-          </a:prstGeom>
-          <a:noFill/>
-        </p:spPr>
-        <p:txBody>
-          <a:bodyPr wrap="square" rtlCol="0">
-            <a:spAutoFit/>
-          </a:bodyPr>
-          <a:lstStyle/>
-          <a:p>
-            <a:pPr algn="ctr"/>
-            <a:r>
-              <a:rPr lang="en-GB" sz="700" dirty="0" smtClean="0"/>
-              <a:t>PBD </a:t>
-            </a:r>
-            <a:endParaRPr lang="en-GB" sz="1600" dirty="0"/>
-          </a:p>
-        </p:txBody>
-      </p:sp>
-      <p:sp>
-        <p:nvSpPr>
-          <p:cNvPr id="34" name="TextBox 33"/>
-          <p:cNvSpPr txBox="1"/>
-          <p:nvPr/>
-        </p:nvSpPr>
-        <p:spPr>
-          <a:xfrm>
-            <a:off x="6732959" y="2466380"/>
-            <a:ext cx="875928" cy="446276"/>
-          </a:xfrm>
-          <a:prstGeom prst="rect">
-            <a:avLst/>
-          </a:prstGeom>
-          <a:noFill/>
-        </p:spPr>
-        <p:txBody>
-          <a:bodyPr wrap="square" rtlCol="0">
-            <a:spAutoFit/>
-          </a:bodyPr>
-          <a:lstStyle/>
-          <a:p>
-            <a:r>
-              <a:rPr lang="en-GB" sz="700" dirty="0" smtClean="0"/>
-              <a:t>Phylogeny</a:t>
-            </a:r>
-          </a:p>
-          <a:p>
-            <a:pPr algn="ctr"/>
-            <a:endParaRPr lang="en-GB" sz="1600" dirty="0"/>
-          </a:p>
-        </p:txBody>
-      </p:sp>
       <p:pic>
         <p:nvPicPr>
           <p:cNvPr id="1030" name="Picture 6"/>
@@ -4173,7 +3987,7 @@
           <p:nvPr/>
         </p:nvPicPr>
         <p:blipFill>
-          <a:blip r:embed="rId10" cstate="print">
+          <a:blip r:embed="rId9" cstate="print">
             <a:lum bright="-23000"/>
           </a:blip>
           <a:srcRect/>
@@ -4247,7 +4061,7 @@
           <p:nvPr/>
         </p:nvPicPr>
         <p:blipFill>
-          <a:blip r:embed="rId11">
+          <a:blip r:embed="rId10">
             <a:extLst>
               <a:ext uri="{28A0092B-C50C-407E-A947-70E740481C1C}">
                 <a14:useLocalDpi xmlns:a14="http://schemas.microsoft.com/office/drawing/2010/main" val="0"/>
@@ -4367,7 +4181,7 @@
           <p:nvPr/>
         </p:nvPicPr>
         <p:blipFill>
-          <a:blip r:embed="rId12" cstate="print">
+          <a:blip r:embed="rId11" cstate="print">
             <a:extLst>
               <a:ext uri="{28A0092B-C50C-407E-A947-70E740481C1C}">
                 <a14:useLocalDpi xmlns:a14="http://schemas.microsoft.com/office/drawing/2010/main" val="0"/>
@@ -4380,7 +4194,7 @@
         </p:blipFill>
         <p:spPr>
           <a:xfrm>
-            <a:off x="4586555" y="1061747"/>
+            <a:off x="4821801" y="1130214"/>
             <a:ext cx="1138290" cy="1455050"/>
           </a:xfrm>
           <a:prstGeom prst="rect">
@@ -4397,7 +4211,7 @@
           <p:nvPr/>
         </p:nvPicPr>
         <p:blipFill>
-          <a:blip r:embed="rId13">
+          <a:blip r:embed="rId12">
             <a:extLst>
               <a:ext uri="{28A0092B-C50C-407E-A947-70E740481C1C}">
                 <a14:useLocalDpi xmlns:a14="http://schemas.microsoft.com/office/drawing/2010/main" val="0"/>
@@ -4421,6 +4235,30 @@
       <p:pic>
         <p:nvPicPr>
           <p:cNvPr id="27" name="Afbeelding 26"/>
+          <p:cNvPicPr>
+            <a:picLocks noChangeAspect="1"/>
+          </p:cNvPicPr>
+          <p:nvPr/>
+        </p:nvPicPr>
+        <p:blipFill>
+          <a:blip r:embed="rId13"/>
+          <a:stretch>
+            <a:fillRect/>
+          </a:stretch>
+        </p:blipFill>
+        <p:spPr>
+          <a:xfrm>
+            <a:off x="127782" y="3976462"/>
+            <a:ext cx="1573904" cy="863558"/>
+          </a:xfrm>
+          <a:prstGeom prst="rect">
+            <a:avLst/>
+          </a:prstGeom>
+        </p:spPr>
+      </p:pic>
+      <p:pic>
+        <p:nvPicPr>
+          <p:cNvPr id="14" name="Afbeelding 13"/>
           <p:cNvPicPr>
             <a:picLocks noChangeAspect="1"/>
           </p:cNvPicPr>
@@ -4434,17 +4272,125 @@
         </p:blipFill>
         <p:spPr>
           <a:xfrm>
-            <a:off x="127782" y="3976462"/>
-            <a:ext cx="1573904" cy="863558"/>
+            <a:off x="195036" y="6637155"/>
+            <a:ext cx="1310234" cy="954798"/>
           </a:xfrm>
           <a:prstGeom prst="rect">
             <a:avLst/>
           </a:prstGeom>
         </p:spPr>
       </p:pic>
+      <p:sp>
+        <p:nvSpPr>
+          <p:cNvPr id="11" name="TextBox 10"/>
+          <p:cNvSpPr txBox="1"/>
+          <p:nvPr/>
+        </p:nvSpPr>
+        <p:spPr>
+          <a:xfrm>
+            <a:off x="2" y="1059632"/>
+            <a:ext cx="1620390" cy="1615827"/>
+          </a:xfrm>
+          <a:prstGeom prst="rect">
+            <a:avLst/>
+          </a:prstGeom>
+          <a:noFill/>
+        </p:spPr>
+        <p:txBody>
+          <a:bodyPr wrap="square" rtlCol="0">
+            <a:spAutoFit/>
+          </a:bodyPr>
+          <a:lstStyle/>
+          <a:p>
+            <a:pPr algn="just"/>
+            <a:r>
+              <a:rPr lang="en-GB" sz="900" dirty="0"/>
+              <a:t>In nature, speciation takes time. Despite this, many phylogenetic inference </a:t>
+            </a:r>
+            <a:r>
+              <a:rPr lang="en-GB" sz="900" dirty="0" smtClean="0"/>
+              <a:t>programs use </a:t>
+            </a:r>
+            <a:r>
+              <a:rPr lang="en-GB" sz="900" dirty="0"/>
+              <a:t>models that assume speciation to happen </a:t>
+            </a:r>
+            <a:r>
+              <a:rPr lang="en-GB" sz="900" dirty="0" smtClean="0"/>
+              <a:t>instantly</a:t>
+            </a:r>
+            <a:r>
+              <a:rPr lang="en-GB" sz="900" dirty="0" smtClean="0"/>
+              <a:t>. One such model is the Birth – Death model (BD).  One model which does take speciation time into account is </a:t>
+            </a:r>
+            <a:r>
+              <a:rPr lang="en-GB" sz="900" dirty="0" err="1" smtClean="0"/>
+              <a:t>Portracted</a:t>
+            </a:r>
+            <a:r>
+              <a:rPr lang="en-GB" sz="900" dirty="0" smtClean="0"/>
+              <a:t> Birth – Death (PBD. </a:t>
+            </a:r>
+          </a:p>
+          <a:p>
+            <a:pPr algn="just"/>
+            <a:endParaRPr lang="nl-NL" sz="900" dirty="0" smtClean="0"/>
+          </a:p>
+        </p:txBody>
+      </p:sp>
+      <p:sp>
+        <p:nvSpPr>
+          <p:cNvPr id="3" name="Tekstvak 2"/>
+          <p:cNvSpPr txBox="1"/>
+          <p:nvPr/>
+        </p:nvSpPr>
+        <p:spPr>
+          <a:xfrm>
+            <a:off x="6084887" y="1059632"/>
+            <a:ext cx="1368152" cy="1477328"/>
+          </a:xfrm>
+          <a:prstGeom prst="rect">
+            <a:avLst/>
+          </a:prstGeom>
+          <a:noFill/>
+        </p:spPr>
+        <p:txBody>
+          <a:bodyPr wrap="square" rtlCol="0">
+            <a:spAutoFit/>
+          </a:bodyPr>
+          <a:lstStyle/>
+          <a:p>
+            <a:pPr algn="just"/>
+            <a:r>
+              <a:rPr lang="en-GB" sz="900" dirty="0" smtClean="0"/>
+              <a:t>PBD adds an </a:t>
+            </a:r>
+            <a:r>
+              <a:rPr lang="en-GB" sz="900" dirty="0"/>
+              <a:t>incipient stage before a species becomes a good species</a:t>
+            </a:r>
+            <a:r>
+              <a:rPr lang="en-GB" sz="900" dirty="0" smtClean="0"/>
+              <a:t>. In </a:t>
+            </a:r>
+            <a:r>
+              <a:rPr lang="en-GB" sz="900" dirty="0"/>
+              <a:t>this research, we test if BEAST2, </a:t>
+            </a:r>
+            <a:r>
+              <a:rPr lang="en-GB" sz="900" dirty="0" smtClean="0"/>
+              <a:t>a </a:t>
+            </a:r>
+            <a:r>
+              <a:rPr lang="en-GB" sz="900" dirty="0"/>
+              <a:t>phylogenetic inference program based on BD, can accurately recover trees that were simulated using the assumptions of PBD.</a:t>
+            </a:r>
+          </a:p>
+        </p:txBody>
+      </p:sp>
       <p:pic>
         <p:nvPicPr>
-          <p:cNvPr id="14" name="Afbeelding 13"/>
+          <p:cNvPr id="16" name="Afbeelding 15"/>
           <p:cNvPicPr>
             <a:picLocks noChangeAspect="1"/>
           </p:cNvPicPr>
@@ -4458,14 +4404,195 @@
         </p:blipFill>
         <p:spPr>
           <a:xfrm>
-            <a:off x="195036" y="6637155"/>
-            <a:ext cx="1310234" cy="954798"/>
+            <a:off x="1579987" y="2175555"/>
+            <a:ext cx="171450" cy="152400"/>
           </a:xfrm>
           <a:prstGeom prst="rect">
             <a:avLst/>
           </a:prstGeom>
         </p:spPr>
       </p:pic>
+      <p:pic>
+        <p:nvPicPr>
+          <p:cNvPr id="40" name="Afbeelding 39"/>
+          <p:cNvPicPr>
+            <a:picLocks noChangeAspect="1"/>
+          </p:cNvPicPr>
+          <p:nvPr/>
+        </p:nvPicPr>
+        <p:blipFill>
+          <a:blip r:embed="rId15"/>
+          <a:stretch>
+            <a:fillRect/>
+          </a:stretch>
+        </p:blipFill>
+        <p:spPr>
+          <a:xfrm>
+            <a:off x="1573738" y="1623085"/>
+            <a:ext cx="171450" cy="152400"/>
+          </a:xfrm>
+          <a:prstGeom prst="rect">
+            <a:avLst/>
+          </a:prstGeom>
+        </p:spPr>
+      </p:pic>
+      <p:pic>
+        <p:nvPicPr>
+          <p:cNvPr id="41" name="Afbeelding 40"/>
+          <p:cNvPicPr>
+            <a:picLocks noChangeAspect="1"/>
+          </p:cNvPicPr>
+          <p:nvPr/>
+        </p:nvPicPr>
+        <p:blipFill>
+          <a:blip r:embed="rId15"/>
+          <a:stretch>
+            <a:fillRect/>
+          </a:stretch>
+        </p:blipFill>
+        <p:spPr>
+          <a:xfrm>
+            <a:off x="1579987" y="1096660"/>
+            <a:ext cx="171450" cy="152400"/>
+          </a:xfrm>
+          <a:prstGeom prst="rect">
+            <a:avLst/>
+          </a:prstGeom>
+        </p:spPr>
+      </p:pic>
+      <p:sp>
+        <p:nvSpPr>
+          <p:cNvPr id="29" name="Tekstvak 28"/>
+          <p:cNvSpPr txBox="1"/>
+          <p:nvPr/>
+        </p:nvSpPr>
+        <p:spPr>
+          <a:xfrm>
+            <a:off x="2844527" y="1073703"/>
+            <a:ext cx="1008112" cy="1477328"/>
+          </a:xfrm>
+          <a:prstGeom prst="rect">
+            <a:avLst/>
+          </a:prstGeom>
+          <a:noFill/>
+        </p:spPr>
+        <p:txBody>
+          <a:bodyPr wrap="square" rtlCol="0">
+            <a:spAutoFit/>
+          </a:bodyPr>
+          <a:lstStyle/>
+          <a:p>
+            <a:r>
+              <a:rPr lang="en-GB" sz="900" dirty="0"/>
+              <a:t>PBD </a:t>
+            </a:r>
+            <a:r>
+              <a:rPr lang="en-GB" sz="900" dirty="0" smtClean="0"/>
+              <a:t>with ( </a:t>
+            </a:r>
+            <a:r>
+              <a:rPr lang="el-GR" sz="900" dirty="0"/>
+              <a:t>λ</a:t>
+            </a:r>
+            <a:r>
+              <a:rPr lang="en-GB" sz="900" dirty="0"/>
+              <a:t> = ∞)</a:t>
+            </a:r>
+          </a:p>
+          <a:p>
+            <a:r>
+              <a:rPr lang="en-GB" sz="900" dirty="0" err="1" smtClean="0"/>
+              <a:t>a.k.a</a:t>
+            </a:r>
+            <a:r>
+              <a:rPr lang="en-GB" sz="900" dirty="0" smtClean="0"/>
+              <a:t> BD</a:t>
+            </a:r>
+          </a:p>
+          <a:p>
+            <a:endParaRPr lang="en-GB" sz="900" dirty="0"/>
+          </a:p>
+          <a:p>
+            <a:endParaRPr lang="en-GB" sz="900" dirty="0" smtClean="0"/>
+          </a:p>
+          <a:p>
+            <a:r>
+              <a:rPr lang="en-GB" sz="900" dirty="0" smtClean="0"/>
+              <a:t>So, an explanation of what these trees are in a few fields here. Lots of space</a:t>
+            </a:r>
+            <a:r>
+              <a:rPr lang="en-GB" sz="900" smtClean="0"/>
+              <a:t>, yay!</a:t>
+            </a:r>
+            <a:endParaRPr lang="en-GB" sz="900" dirty="0" smtClean="0"/>
+          </a:p>
+        </p:txBody>
+      </p:sp>
+      <p:sp>
+        <p:nvSpPr>
+          <p:cNvPr id="36" name="Tekstvak 35"/>
+          <p:cNvSpPr txBox="1"/>
+          <p:nvPr/>
+        </p:nvSpPr>
+        <p:spPr>
+          <a:xfrm>
+            <a:off x="4620504" y="2123470"/>
+            <a:ext cx="936104" cy="584775"/>
+          </a:xfrm>
+          <a:prstGeom prst="rect">
+            <a:avLst/>
+          </a:prstGeom>
+          <a:noFill/>
+        </p:spPr>
+        <p:txBody>
+          <a:bodyPr wrap="square" rtlCol="0">
+            <a:spAutoFit/>
+          </a:bodyPr>
+          <a:lstStyle/>
+          <a:p>
+            <a:pPr>
+              <a:tabLst>
+                <a:tab pos="88900" algn="l"/>
+                <a:tab pos="179388" algn="l"/>
+              </a:tabLst>
+            </a:pPr>
+            <a:r>
+              <a:rPr lang="en-GB" sz="800" dirty="0" smtClean="0"/>
+              <a:t>b 	= 	birth</a:t>
+            </a:r>
+            <a:endParaRPr lang="en-GB" sz="800" dirty="0"/>
+          </a:p>
+          <a:p>
+            <a:pPr>
+              <a:tabLst>
+                <a:tab pos="179388" algn="l"/>
+              </a:tabLst>
+            </a:pPr>
+            <a:r>
+              <a:rPr lang="el-GR" sz="800" dirty="0" smtClean="0"/>
+              <a:t>λ</a:t>
+            </a:r>
+            <a:r>
+              <a:rPr lang="en-GB" sz="800" dirty="0" smtClean="0"/>
+              <a:t>  = 	speciation 	completion</a:t>
+            </a:r>
+            <a:endParaRPr lang="en-GB" sz="800" dirty="0"/>
+          </a:p>
+          <a:p>
+            <a:pPr>
+              <a:tabLst>
+                <a:tab pos="88900" algn="l"/>
+                <a:tab pos="179388" algn="l"/>
+              </a:tabLst>
+            </a:pPr>
+            <a:r>
+              <a:rPr lang="en-GB" sz="800" dirty="0" smtClean="0"/>
+              <a:t>μ 	= 	extinction</a:t>
+            </a:r>
+            <a:endParaRPr lang="en-GB" sz="800" dirty="0"/>
+          </a:p>
+        </p:txBody>
+      </p:sp>
     </p:spTree>
   </p:cSld>
   <p:clrMapOvr>

</xml_diff>

<commit_message>
Including a pdf version
</commit_message>
<xml_diff>
--- a/doc/poster_final_femke_deel.pptx
+++ b/doc/poster_final_femke_deel.pptx
@@ -3094,23 +3094,25 @@
       </p:grpSpPr>
       <p:pic>
         <p:nvPicPr>
-          <p:cNvPr id="1034" name="Picture 10" descr="C:\Users\Aline\Downloads\Faeded.jpg"/>
+          <p:cNvPr id="1032" name="Picture 8" descr="C:\Users\Aline\Downloads\Faeded.jpg"/>
           <p:cNvPicPr>
             <a:picLocks noChangeAspect="1" noChangeArrowheads="1"/>
           </p:cNvPicPr>
           <p:nvPr/>
         </p:nvPicPr>
         <p:blipFill>
-          <a:blip r:embed="rId2" cstate="print"/>
-          <a:srcRect t="74515" b="15291"/>
+          <a:blip r:embed="rId2" cstate="print">
+            <a:lum contrast="5000"/>
+          </a:blip>
+          <a:srcRect t="64635" b="3047"/>
           <a:stretch>
             <a:fillRect/>
           </a:stretch>
         </p:blipFill>
         <p:spPr bwMode="auto">
-          <a:xfrm rot="10800000">
-            <a:off x="2844527" y="2754412"/>
-            <a:ext cx="4716736" cy="288032"/>
+          <a:xfrm>
+            <a:off x="0" y="2754412"/>
+            <a:ext cx="2775405" cy="288032"/>
           </a:xfrm>
           <a:prstGeom prst="rect">
             <a:avLst/>
@@ -3123,55 +3125,16 @@
           </a:ln>
         </p:spPr>
       </p:pic>
-      <p:pic>
-        <p:nvPicPr>
-          <p:cNvPr id="1033" name="Picture 9" descr="C:\Users\Aline\Downloads\Faeded.jpg"/>
-          <p:cNvPicPr>
-            <a:picLocks noChangeAspect="1" noChangeArrowheads="1"/>
-          </p:cNvPicPr>
+      <p:sp>
+        <p:nvSpPr>
+          <p:cNvPr id="44" name="Rectangle 5"/>
+          <p:cNvSpPr/>
           <p:nvPr/>
-        </p:nvPicPr>
-        <p:blipFill>
-          <a:blip r:embed="rId2" cstate="print">
-            <a:lum bright="10000" contrast="10000"/>
-          </a:blip>
-          <a:srcRect t="1739" r="91887"/>
-          <a:stretch>
-            <a:fillRect/>
-          </a:stretch>
-        </p:blipFill>
-        <p:spPr bwMode="auto">
-          <a:xfrm rot="16200000">
-            <a:off x="5066396" y="7591852"/>
-            <a:ext cx="298016" cy="4716736"/>
-          </a:xfrm>
-          <a:prstGeom prst="rect">
-            <a:avLst/>
-          </a:prstGeom>
-          <a:noFill/>
-        </p:spPr>
-      </p:pic>
-      <p:pic>
-        <p:nvPicPr>
-          <p:cNvPr id="1032" name="Picture 8" descr="C:\Users\Aline\Downloads\Faeded.jpg"/>
-          <p:cNvPicPr>
-            <a:picLocks noChangeAspect="1" noChangeArrowheads="1"/>
-          </p:cNvPicPr>
-          <p:nvPr/>
-        </p:nvPicPr>
-        <p:blipFill>
-          <a:blip r:embed="rId3" cstate="print">
-            <a:lum contrast="5000"/>
-          </a:blip>
-          <a:srcRect t="64635" b="3047"/>
-          <a:stretch>
-            <a:fillRect/>
-          </a:stretch>
-        </p:blipFill>
-        <p:spPr bwMode="auto">
-          <a:xfrm>
-            <a:off x="0" y="2754412"/>
-            <a:ext cx="2775405" cy="288032"/>
+        </p:nvSpPr>
+        <p:spPr>
+          <a:xfrm>
+            <a:off x="2830873" y="2815997"/>
+            <a:ext cx="4742898" cy="1435967"/>
           </a:xfrm>
           <a:prstGeom prst="rect">
             <a:avLst/>
@@ -3180,61 +3143,6 @@
           <a:ln>
             <a:solidFill>
               <a:srgbClr val="4E2D12"/>
-            </a:solidFill>
-          </a:ln>
-        </p:spPr>
-      </p:pic>
-      <p:pic>
-        <p:nvPicPr>
-          <p:cNvPr id="1031" name="Picture 7" descr="C:\Users\Aline\Downloads\Faeded.jpg"/>
-          <p:cNvPicPr>
-            <a:picLocks noChangeAspect="1" noChangeArrowheads="1"/>
-          </p:cNvPicPr>
-          <p:nvPr/>
-        </p:nvPicPr>
-        <p:blipFill>
-          <a:blip r:embed="rId2" cstate="print">
-            <a:lum contrast="10000"/>
-          </a:blip>
-          <a:srcRect b="70464"/>
-          <a:stretch>
-            <a:fillRect/>
-          </a:stretch>
-        </p:blipFill>
-        <p:spPr bwMode="auto">
-          <a:xfrm>
-            <a:off x="0" y="0"/>
-            <a:ext cx="7561263" cy="1026220"/>
-          </a:xfrm>
-          <a:prstGeom prst="rect">
-            <a:avLst/>
-          </a:prstGeom>
-          <a:noFill/>
-          <a:ln>
-            <a:solidFill>
-              <a:srgbClr val="4E2D12"/>
-            </a:solidFill>
-          </a:ln>
-        </p:spPr>
-      </p:pic>
-      <p:sp>
-        <p:nvSpPr>
-          <p:cNvPr id="4" name="Rectangle 3"/>
-          <p:cNvSpPr/>
-          <p:nvPr/>
-        </p:nvSpPr>
-        <p:spPr>
-          <a:xfrm>
-            <a:off x="0" y="1"/>
-            <a:ext cx="7561263" cy="1026220"/>
-          </a:xfrm>
-          <a:prstGeom prst="rect">
-            <a:avLst/>
-          </a:prstGeom>
-          <a:noFill/>
-          <a:ln>
-            <a:solidFill>
-              <a:srgbClr val="492303"/>
             </a:solidFill>
           </a:ln>
         </p:spPr>
@@ -3259,67 +3167,51 @@
           <a:lstStyle/>
           <a:p>
             <a:pPr algn="ctr"/>
-            <a:r>
-              <a:rPr lang="nl-NL" sz="2400" b="1" dirty="0" smtClean="0">
-                <a:solidFill>
-                  <a:srgbClr val="492303"/>
-                </a:solidFill>
-              </a:rPr>
-              <a:t>Inferring</a:t>
-            </a:r>
-            <a:r>
-              <a:rPr lang="nl-NL" sz="2400" dirty="0" smtClean="0">
-                <a:solidFill>
-                  <a:srgbClr val="492303"/>
-                </a:solidFill>
-              </a:rPr>
-              <a:t> </a:t>
-            </a:r>
-            <a:r>
-              <a:rPr lang="nl-NL" sz="2400" b="1" dirty="0" smtClean="0">
-                <a:solidFill>
-                  <a:srgbClr val="492303"/>
-                </a:solidFill>
-              </a:rPr>
-              <a:t>Phylogenies</a:t>
-            </a:r>
-            <a:r>
-              <a:rPr lang="nl-NL" sz="2400" dirty="0" smtClean="0">
-                <a:solidFill>
-                  <a:srgbClr val="492303"/>
-                </a:solidFill>
-              </a:rPr>
-              <a:t>:</a:t>
-            </a:r>
-          </a:p>
-          <a:p>
-            <a:pPr algn="ctr"/>
-            <a:r>
-              <a:rPr lang="nl-NL" dirty="0" smtClean="0">
-                <a:solidFill>
-                  <a:srgbClr val="492303"/>
-                </a:solidFill>
-              </a:rPr>
-              <a:t>BEAST2 and the Protracted Birth-Death Model</a:t>
-            </a:r>
-            <a:endParaRPr lang="en-GB" dirty="0">
-              <a:solidFill>
-                <a:srgbClr val="492303"/>
-              </a:solidFill>
-            </a:endParaRPr>
-          </a:p>
-        </p:txBody>
-      </p:sp>
-      <p:sp>
-        <p:nvSpPr>
-          <p:cNvPr id="6" name="Rectangle 5"/>
+            <a:endParaRPr lang="en-GB"/>
+          </a:p>
+        </p:txBody>
+      </p:sp>
+      <p:pic>
+        <p:nvPicPr>
+          <p:cNvPr id="43" name="Picture 10" descr="C:\Users\Aline\Downloads\Faeded.jpg"/>
+          <p:cNvPicPr>
+            <a:picLocks noChangeAspect="1" noChangeArrowheads="1"/>
+          </p:cNvPicPr>
+          <p:nvPr/>
+        </p:nvPicPr>
+        <p:blipFill>
+          <a:blip r:embed="rId3" cstate="print"/>
+          <a:srcRect t="74515" b="15291"/>
+          <a:stretch>
+            <a:fillRect/>
+          </a:stretch>
+        </p:blipFill>
+        <p:spPr bwMode="auto">
+          <a:xfrm rot="10800000" flipV="1">
+            <a:off x="2830571" y="2758949"/>
+            <a:ext cx="4743199" cy="288032"/>
+          </a:xfrm>
+          <a:prstGeom prst="rect">
+            <a:avLst/>
+          </a:prstGeom>
+          <a:noFill/>
+          <a:ln>
+            <a:solidFill>
+              <a:srgbClr val="4E2D12"/>
+            </a:solidFill>
+          </a:ln>
+        </p:spPr>
+      </p:pic>
+      <p:sp>
+        <p:nvSpPr>
+          <p:cNvPr id="9" name="Rectangle 8"/>
           <p:cNvSpPr/>
           <p:nvPr/>
         </p:nvSpPr>
         <p:spPr>
           <a:xfrm>
-            <a:off x="2844528" y="2754412"/>
-            <a:ext cx="4716736" cy="3739503"/>
+            <a:off x="2828171" y="10099228"/>
+            <a:ext cx="4733093" cy="594172"/>
           </a:xfrm>
           <a:prstGeom prst="rect">
             <a:avLst/>
@@ -3358,14 +3250,14 @@
       </p:sp>
       <p:sp>
         <p:nvSpPr>
-          <p:cNvPr id="8" name="Rectangle 7"/>
+          <p:cNvPr id="6" name="Rectangle 5"/>
           <p:cNvSpPr/>
           <p:nvPr/>
         </p:nvSpPr>
         <p:spPr>
           <a:xfrm>
-            <a:off x="0" y="2754412"/>
-            <a:ext cx="2775405" cy="7938988"/>
+            <a:off x="2828174" y="4440973"/>
+            <a:ext cx="4745599" cy="3774507"/>
           </a:xfrm>
           <a:prstGeom prst="rect">
             <a:avLst/>
@@ -3402,16 +3294,201 @@
           </a:p>
         </p:txBody>
       </p:sp>
-      <p:sp>
-        <p:nvSpPr>
-          <p:cNvPr id="9" name="Rectangle 8"/>
+      <p:pic>
+        <p:nvPicPr>
+          <p:cNvPr id="1034" name="Picture 10" descr="C:\Users\Aline\Downloads\Faeded.jpg"/>
+          <p:cNvPicPr>
+            <a:picLocks noChangeAspect="1" noChangeArrowheads="1"/>
+          </p:cNvPicPr>
+          <p:nvPr/>
+        </p:nvPicPr>
+        <p:blipFill>
+          <a:blip r:embed="rId3" cstate="print"/>
+          <a:srcRect t="74515" b="15291"/>
+          <a:stretch>
+            <a:fillRect/>
+          </a:stretch>
+        </p:blipFill>
+        <p:spPr bwMode="auto">
+          <a:xfrm rot="10800000">
+            <a:off x="2834885" y="4221457"/>
+            <a:ext cx="4738887" cy="281903"/>
+          </a:xfrm>
+          <a:prstGeom prst="rect">
+            <a:avLst/>
+          </a:prstGeom>
+          <a:noFill/>
+          <a:ln>
+            <a:solidFill>
+              <a:srgbClr val="4E2D12"/>
+            </a:solidFill>
+          </a:ln>
+        </p:spPr>
+      </p:pic>
+      <p:pic>
+        <p:nvPicPr>
+          <p:cNvPr id="1033" name="Picture 9" descr="C:\Users\Aline\Downloads\Faeded.jpg"/>
+          <p:cNvPicPr>
+            <a:picLocks noChangeAspect="1" noChangeArrowheads="1"/>
+          </p:cNvPicPr>
+          <p:nvPr/>
+        </p:nvPicPr>
+        <p:blipFill>
+          <a:blip r:embed="rId3" cstate="print">
+            <a:lum bright="10000" contrast="10000"/>
+          </a:blip>
+          <a:srcRect t="1739" r="91887"/>
+          <a:stretch>
+            <a:fillRect/>
+          </a:stretch>
+        </p:blipFill>
+        <p:spPr bwMode="auto">
+          <a:xfrm rot="16200000">
+            <a:off x="5051964" y="7577419"/>
+            <a:ext cx="298016" cy="4745602"/>
+          </a:xfrm>
+          <a:prstGeom prst="rect">
+            <a:avLst/>
+          </a:prstGeom>
+          <a:noFill/>
+        </p:spPr>
+      </p:pic>
+      <p:pic>
+        <p:nvPicPr>
+          <p:cNvPr id="1031" name="Picture 7" descr="C:\Users\Aline\Downloads\Faeded.jpg"/>
+          <p:cNvPicPr>
+            <a:picLocks noChangeAspect="1" noChangeArrowheads="1"/>
+          </p:cNvPicPr>
+          <p:nvPr/>
+        </p:nvPicPr>
+        <p:blipFill>
+          <a:blip r:embed="rId3" cstate="print">
+            <a:lum contrast="10000"/>
+          </a:blip>
+          <a:srcRect b="70464"/>
+          <a:stretch>
+            <a:fillRect/>
+          </a:stretch>
+        </p:blipFill>
+        <p:spPr bwMode="auto">
+          <a:xfrm>
+            <a:off x="0" y="0"/>
+            <a:ext cx="7561263" cy="1026220"/>
+          </a:xfrm>
+          <a:prstGeom prst="rect">
+            <a:avLst/>
+          </a:prstGeom>
+          <a:noFill/>
+          <a:ln>
+            <a:solidFill>
+              <a:srgbClr val="4E2D12"/>
+            </a:solidFill>
+          </a:ln>
+        </p:spPr>
+      </p:pic>
+      <p:sp>
+        <p:nvSpPr>
+          <p:cNvPr id="4" name="Rectangle 3"/>
           <p:cNvSpPr/>
           <p:nvPr/>
         </p:nvSpPr>
         <p:spPr>
           <a:xfrm>
-            <a:off x="2844528" y="10099228"/>
-            <a:ext cx="4716736" cy="594172"/>
+            <a:off x="0" y="1"/>
+            <a:ext cx="7561263" cy="1026220"/>
+          </a:xfrm>
+          <a:prstGeom prst="rect">
+            <a:avLst/>
+          </a:prstGeom>
+          <a:noFill/>
+          <a:ln>
+            <a:solidFill>
+              <a:srgbClr val="492303"/>
+            </a:solidFill>
+          </a:ln>
+        </p:spPr>
+        <p:style>
+          <a:lnRef idx="2">
+            <a:schemeClr val="accent1">
+              <a:shade val="50000"/>
+            </a:schemeClr>
+          </a:lnRef>
+          <a:fillRef idx="1">
+            <a:schemeClr val="accent1"/>
+          </a:fillRef>
+          <a:effectRef idx="0">
+            <a:schemeClr val="accent1"/>
+          </a:effectRef>
+          <a:fontRef idx="minor">
+            <a:schemeClr val="lt1"/>
+          </a:fontRef>
+        </p:style>
+        <p:txBody>
+          <a:bodyPr lIns="99569" tIns="49785" rIns="99569" bIns="49785" rtlCol="0" anchor="ctr"/>
+          <a:lstStyle/>
+          <a:p>
+            <a:pPr algn="ctr"/>
+            <a:r>
+              <a:rPr lang="nl-NL" sz="2400" b="1" dirty="0" smtClean="0">
+                <a:solidFill>
+                  <a:srgbClr val="492303"/>
+                </a:solidFill>
+              </a:rPr>
+              <a:t>Inferring</a:t>
+            </a:r>
+            <a:r>
+              <a:rPr lang="nl-NL" sz="2400" dirty="0" smtClean="0">
+                <a:solidFill>
+                  <a:srgbClr val="492303"/>
+                </a:solidFill>
+              </a:rPr>
+              <a:t> </a:t>
+            </a:r>
+            <a:r>
+              <a:rPr lang="nl-NL" sz="2400" b="1" dirty="0" smtClean="0">
+                <a:solidFill>
+                  <a:srgbClr val="492303"/>
+                </a:solidFill>
+              </a:rPr>
+              <a:t>Phylogenies</a:t>
+            </a:r>
+            <a:r>
+              <a:rPr lang="nl-NL" sz="2400" dirty="0" smtClean="0">
+                <a:solidFill>
+                  <a:srgbClr val="492303"/>
+                </a:solidFill>
+              </a:rPr>
+              <a:t>:</a:t>
+            </a:r>
+          </a:p>
+          <a:p>
+            <a:pPr algn="ctr"/>
+            <a:r>
+              <a:rPr lang="nl-NL" dirty="0" smtClean="0">
+                <a:solidFill>
+                  <a:srgbClr val="492303"/>
+                </a:solidFill>
+              </a:rPr>
+              <a:t>BEAST2 and the Protracted Birth-Death Model</a:t>
+            </a:r>
+            <a:endParaRPr lang="en-GB" dirty="0">
+              <a:solidFill>
+                <a:srgbClr val="492303"/>
+              </a:solidFill>
+            </a:endParaRPr>
+          </a:p>
+        </p:txBody>
+      </p:sp>
+      <p:sp>
+        <p:nvSpPr>
+          <p:cNvPr id="8" name="Rectangle 7"/>
+          <p:cNvSpPr/>
+          <p:nvPr/>
+        </p:nvSpPr>
+        <p:spPr>
+          <a:xfrm>
+            <a:off x="0" y="2754412"/>
+            <a:ext cx="2775405" cy="7938988"/>
           </a:xfrm>
           <a:prstGeom prst="rect">
             <a:avLst/>
@@ -3864,72 +3941,14 @@
       </p:sp>
       <p:sp>
         <p:nvSpPr>
-          <p:cNvPr id="30" name="Rectangle 29"/>
-          <p:cNvSpPr/>
-          <p:nvPr/>
-        </p:nvSpPr>
-        <p:spPr>
-          <a:xfrm>
-            <a:off x="2844528" y="2754412"/>
-            <a:ext cx="4716735" cy="288032"/>
-          </a:xfrm>
-          <a:prstGeom prst="rect">
-            <a:avLst/>
-          </a:prstGeom>
-          <a:noFill/>
-          <a:ln>
-            <a:solidFill>
-              <a:srgbClr val="4E2D12"/>
-            </a:solidFill>
-          </a:ln>
-        </p:spPr>
-        <p:style>
-          <a:lnRef idx="2">
-            <a:schemeClr val="accent1">
-              <a:shade val="50000"/>
-            </a:schemeClr>
-          </a:lnRef>
-          <a:fillRef idx="1">
-            <a:schemeClr val="accent1"/>
-          </a:fillRef>
-          <a:effectRef idx="0">
-            <a:schemeClr val="accent1"/>
-          </a:effectRef>
-          <a:fontRef idx="minor">
-            <a:schemeClr val="lt1"/>
-          </a:fontRef>
-        </p:style>
-        <p:txBody>
-          <a:bodyPr lIns="99569" tIns="49785" rIns="99569" bIns="49785" rtlCol="0" anchor="ctr"/>
-          <a:lstStyle/>
-          <a:p>
-            <a:pPr algn="ctr"/>
-            <a:r>
-              <a:rPr lang="en-GB" sz="1400" dirty="0" smtClean="0">
-                <a:solidFill>
-                  <a:srgbClr val="492303"/>
-                </a:solidFill>
-              </a:rPr>
-              <a:t>Results</a:t>
-            </a:r>
-            <a:endParaRPr lang="en-GB" dirty="0">
-              <a:solidFill>
-                <a:srgbClr val="492303"/>
-              </a:solidFill>
-            </a:endParaRPr>
-          </a:p>
-        </p:txBody>
-      </p:sp>
-      <p:sp>
-        <p:nvSpPr>
           <p:cNvPr id="31" name="Rectangle 30"/>
           <p:cNvSpPr/>
           <p:nvPr/>
         </p:nvSpPr>
         <p:spPr>
           <a:xfrm>
-            <a:off x="2844527" y="9801212"/>
-            <a:ext cx="4716736" cy="298016"/>
+            <a:off x="2828171" y="9801212"/>
+            <a:ext cx="4733092" cy="298016"/>
           </a:xfrm>
           <a:prstGeom prst="rect">
             <a:avLst/>
@@ -4022,7 +4041,7 @@
         </p:nvSpPr>
         <p:spPr>
           <a:xfrm>
-            <a:off x="4228109" y="6469607"/>
+            <a:off x="4113770" y="8262369"/>
             <a:ext cx="1949572" cy="307777"/>
           </a:xfrm>
           <a:prstGeom prst="rect">
@@ -4074,8 +4093,8 @@
         </p:blipFill>
         <p:spPr>
           <a:xfrm>
-            <a:off x="2864125" y="4828433"/>
-            <a:ext cx="2716705" cy="1651158"/>
+            <a:off x="2914338" y="6463455"/>
+            <a:ext cx="2865449" cy="1741562"/>
           </a:xfrm>
           <a:prstGeom prst="rect">
             <a:avLst/>
@@ -4084,14 +4103,14 @@
       </p:pic>
       <p:sp>
         <p:nvSpPr>
-          <p:cNvPr id="7" name="Tekstvak 6"/>
+          <p:cNvPr id="10" name="Tekstvak 9"/>
           <p:cNvSpPr txBox="1"/>
           <p:nvPr/>
         </p:nvSpPr>
         <p:spPr>
           <a:xfrm>
-            <a:off x="5580830" y="3186460"/>
-            <a:ext cx="1872210" cy="1200329"/>
+            <a:off x="2828176" y="8544233"/>
+            <a:ext cx="4608512" cy="1200329"/>
           </a:xfrm>
           <a:prstGeom prst="rect">
             <a:avLst/>
@@ -4104,71 +4123,35 @@
           </a:bodyPr>
           <a:lstStyle/>
           <a:p>
+            <a:pPr algn="just"/>
             <a:r>
               <a:rPr lang="en-GB" sz="900" dirty="0" smtClean="0"/>
-              <a:t>Something about the graphs, and how the speciation completion rate (SCR) seems to have less impact on the correct recovery of the tree than other parameters, like the mutation rate.  Also, we need to explain the gamma statistic somewhere.</a:t>
+              <a:t>Under all combinations of parameter settings, the gamma statistic was recovered quite well. We had expected lower SCR to increase deviations, but </a:t>
+            </a:r>
+            <a:r>
+              <a:rPr lang="en-GB" sz="900" dirty="0"/>
+              <a:t>o</a:t>
+            </a:r>
+            <a:r>
+              <a:rPr lang="en-GB" sz="900" dirty="0" smtClean="0"/>
+              <a:t>ther parameters appear to have more impact on the correct recovery of a PBD tree than </a:t>
+            </a:r>
+            <a:r>
+              <a:rPr lang="en-GB" sz="900" dirty="0" err="1" smtClean="0"/>
+              <a:t>protractedness</a:t>
+            </a:r>
+            <a:r>
+              <a:rPr lang="en-GB" sz="900" dirty="0" smtClean="0"/>
+              <a:t>. </a:t>
+            </a:r>
+          </a:p>
+          <a:p>
+            <a:pPr algn="just"/>
+            <a:r>
+              <a:rPr lang="en-GB" sz="900" dirty="0" smtClean="0"/>
+              <a:t>For this reason, with the results we have now, we think it is not necessary to include PBD in BEAST2. However, the gamma statistic is just one way to summarize a tree in one number – there could very well be other statistics that are less well recovered by BEAST2. This is why it would be prudent to look at other methods of comparing the sampled species trees and the posterior in further analysis.</a:t>
             </a:r>
             <a:endParaRPr lang="en-GB" sz="900" dirty="0"/>
-          </a:p>
-        </p:txBody>
-      </p:sp>
-      <p:sp>
-        <p:nvSpPr>
-          <p:cNvPr id="10" name="Tekstvak 9"/>
-          <p:cNvSpPr txBox="1"/>
-          <p:nvPr/>
-        </p:nvSpPr>
-        <p:spPr>
-          <a:xfrm>
-            <a:off x="2844527" y="6671443"/>
-            <a:ext cx="4608512" cy="1615827"/>
-          </a:xfrm>
-          <a:prstGeom prst="rect">
-            <a:avLst/>
-          </a:prstGeom>
-          <a:noFill/>
-        </p:spPr>
-        <p:txBody>
-          <a:bodyPr wrap="square" rtlCol="0">
-            <a:spAutoFit/>
-          </a:bodyPr>
-          <a:lstStyle/>
-          <a:p>
-            <a:r>
-              <a:rPr lang="en-GB" sz="900" dirty="0" smtClean="0"/>
-              <a:t>Other parameters seem to have more impact on the correct recovery of a PBD tree than the SCR, and with that </a:t>
-            </a:r>
-            <a:r>
-              <a:rPr lang="en-GB" sz="900" dirty="0" err="1" smtClean="0"/>
-              <a:t>portractedness</a:t>
-            </a:r>
-            <a:r>
-              <a:rPr lang="en-GB" sz="900" dirty="0" smtClean="0"/>
-              <a:t>. For this reason, with the results we have now, we think it is not necessary to include PBD in BEAST2. However, the gamma statistic is a summery of the tree in one number – there might well be other problems that gamma doesn’t detect. This is why it would be prudent to look at other methods of comparing the sampled species trees and the posterior before being too certain about this conclusion. </a:t>
-            </a:r>
-          </a:p>
-          <a:p>
-            <a:endParaRPr lang="en-GB" sz="900" dirty="0"/>
-          </a:p>
-          <a:p>
-            <a:endParaRPr lang="en-GB" sz="900" dirty="0" smtClean="0"/>
-          </a:p>
-          <a:p>
-            <a:endParaRPr lang="en-GB" sz="900" dirty="0"/>
-          </a:p>
-          <a:p>
-            <a:r>
-              <a:rPr lang="en-GB" sz="900" dirty="0" smtClean="0"/>
-              <a:t>General idea – can be expanded. Also, if we don’t need that much room here… maybe we could make </a:t>
-            </a:r>
-            <a:r>
-              <a:rPr lang="en-GB" sz="900" smtClean="0"/>
-              <a:t>a field above the results </a:t>
-            </a:r>
-            <a:r>
-              <a:rPr lang="en-GB" sz="900" dirty="0" smtClean="0"/>
-              <a:t>where we explain the gamma statistic?</a:t>
-            </a:r>
           </a:p>
         </p:txBody>
       </p:sp>
@@ -4224,8 +4207,8 @@
         </p:blipFill>
         <p:spPr>
           <a:xfrm>
-            <a:off x="2864409" y="3216077"/>
-            <a:ext cx="2716421" cy="1650986"/>
+            <a:off x="2885079" y="4517360"/>
+            <a:ext cx="3246395" cy="1973094"/>
           </a:xfrm>
           <a:prstGeom prst="rect">
             <a:avLst/>
@@ -4317,11 +4300,7 @@
             </a:r>
             <a:r>
               <a:rPr lang="en-GB" sz="900" dirty="0" smtClean="0"/>
-              <a:t>instantly</a:t>
-            </a:r>
-            <a:r>
-              <a:rPr lang="en-GB" sz="900" dirty="0" smtClean="0"/>
-              <a:t>. One such model is the Birth – Death model (BD).  One model which does take speciation time into account is </a:t>
+              <a:t>instantly. One such model is the Birth – Death model (BD).  One model which does take speciation time into account is </a:t>
             </a:r>
             <a:r>
               <a:rPr lang="en-GB" sz="900" dirty="0" err="1" smtClean="0"/>
@@ -4590,6 +4569,252 @@
               <a:t>μ 	= 	extinction</a:t>
             </a:r>
             <a:endParaRPr lang="en-GB" sz="800" dirty="0"/>
+          </a:p>
+        </p:txBody>
+      </p:sp>
+      <p:sp>
+        <p:nvSpPr>
+          <p:cNvPr id="32" name="Tekstvak 31"/>
+          <p:cNvSpPr txBox="1"/>
+          <p:nvPr/>
+        </p:nvSpPr>
+        <p:spPr>
+          <a:xfrm>
+            <a:off x="195036" y="3186460"/>
+            <a:ext cx="2217443" cy="400110"/>
+          </a:xfrm>
+          <a:prstGeom prst="rect">
+            <a:avLst/>
+          </a:prstGeom>
+          <a:noFill/>
+        </p:spPr>
+        <p:txBody>
+          <a:bodyPr wrap="square" rtlCol="0">
+            <a:spAutoFit/>
+          </a:bodyPr>
+          <a:lstStyle/>
+          <a:p>
+            <a:r>
+              <a:rPr lang="en-GB" dirty="0" smtClean="0"/>
+              <a:t>SPACE</a:t>
+            </a:r>
+            <a:endParaRPr lang="en-GB" dirty="0"/>
+          </a:p>
+        </p:txBody>
+      </p:sp>
+      <p:sp>
+        <p:nvSpPr>
+          <p:cNvPr id="42" name="Rectangle 27"/>
+          <p:cNvSpPr/>
+          <p:nvPr/>
+        </p:nvSpPr>
+        <p:spPr>
+          <a:xfrm>
+            <a:off x="2828171" y="2750421"/>
+            <a:ext cx="4745600" cy="292024"/>
+          </a:xfrm>
+          <a:prstGeom prst="rect">
+            <a:avLst/>
+          </a:prstGeom>
+          <a:noFill/>
+          <a:ln>
+            <a:solidFill>
+              <a:srgbClr val="4E2D12"/>
+            </a:solidFill>
+          </a:ln>
+        </p:spPr>
+        <p:style>
+          <a:lnRef idx="2">
+            <a:schemeClr val="accent1">
+              <a:shade val="50000"/>
+            </a:schemeClr>
+          </a:lnRef>
+          <a:fillRef idx="1">
+            <a:schemeClr val="accent1"/>
+          </a:fillRef>
+          <a:effectRef idx="0">
+            <a:schemeClr val="accent1"/>
+          </a:effectRef>
+          <a:fontRef idx="minor">
+            <a:schemeClr val="lt1"/>
+          </a:fontRef>
+        </p:style>
+        <p:txBody>
+          <a:bodyPr lIns="99569" tIns="49785" rIns="99569" bIns="49785" rtlCol="0" anchor="ctr"/>
+          <a:lstStyle/>
+          <a:p>
+            <a:pPr algn="ctr"/>
+            <a:r>
+              <a:rPr lang="en-GB" sz="1400" dirty="0">
+                <a:solidFill>
+                  <a:srgbClr val="492303"/>
+                </a:solidFill>
+              </a:rPr>
+              <a:t>The </a:t>
+            </a:r>
+            <a:r>
+              <a:rPr lang="el-GR" sz="1400" dirty="0">
+                <a:solidFill>
+                  <a:srgbClr val="492303"/>
+                </a:solidFill>
+              </a:rPr>
+              <a:t>γ</a:t>
+            </a:r>
+            <a:r>
+              <a:rPr lang="en-GB" sz="1400" dirty="0">
+                <a:solidFill>
+                  <a:srgbClr val="492303"/>
+                </a:solidFill>
+              </a:rPr>
+              <a:t> statistic</a:t>
+            </a:r>
+          </a:p>
+        </p:txBody>
+      </p:sp>
+      <p:sp>
+        <p:nvSpPr>
+          <p:cNvPr id="30" name="Rectangle 29"/>
+          <p:cNvSpPr/>
+          <p:nvPr/>
+        </p:nvSpPr>
+        <p:spPr>
+          <a:xfrm>
+            <a:off x="2828174" y="4215181"/>
+            <a:ext cx="4745597" cy="288032"/>
+          </a:xfrm>
+          <a:prstGeom prst="rect">
+            <a:avLst/>
+          </a:prstGeom>
+          <a:noFill/>
+          <a:ln>
+            <a:solidFill>
+              <a:srgbClr val="4E2D12"/>
+            </a:solidFill>
+          </a:ln>
+        </p:spPr>
+        <p:style>
+          <a:lnRef idx="2">
+            <a:schemeClr val="accent1">
+              <a:shade val="50000"/>
+            </a:schemeClr>
+          </a:lnRef>
+          <a:fillRef idx="1">
+            <a:schemeClr val="accent1"/>
+          </a:fillRef>
+          <a:effectRef idx="0">
+            <a:schemeClr val="accent1"/>
+          </a:effectRef>
+          <a:fontRef idx="minor">
+            <a:schemeClr val="lt1"/>
+          </a:fontRef>
+        </p:style>
+        <p:txBody>
+          <a:bodyPr lIns="99569" tIns="49785" rIns="99569" bIns="49785" rtlCol="0" anchor="ctr"/>
+          <a:lstStyle/>
+          <a:p>
+            <a:pPr algn="ctr"/>
+            <a:r>
+              <a:rPr lang="en-GB" sz="1400" dirty="0" smtClean="0">
+                <a:solidFill>
+                  <a:srgbClr val="492303"/>
+                </a:solidFill>
+              </a:rPr>
+              <a:t>Results</a:t>
+            </a:r>
+            <a:endParaRPr lang="en-GB" dirty="0">
+              <a:solidFill>
+                <a:srgbClr val="492303"/>
+              </a:solidFill>
+            </a:endParaRPr>
+          </a:p>
+        </p:txBody>
+      </p:sp>
+      <p:sp>
+        <p:nvSpPr>
+          <p:cNvPr id="7" name="Tekstvak 6"/>
+          <p:cNvSpPr txBox="1"/>
+          <p:nvPr/>
+        </p:nvSpPr>
+        <p:spPr>
+          <a:xfrm>
+            <a:off x="6063342" y="4628177"/>
+            <a:ext cx="1373346" cy="3139321"/>
+          </a:xfrm>
+          <a:prstGeom prst="rect">
+            <a:avLst/>
+          </a:prstGeom>
+          <a:noFill/>
+        </p:spPr>
+        <p:txBody>
+          <a:bodyPr wrap="square" rtlCol="0">
+            <a:spAutoFit/>
+          </a:bodyPr>
+          <a:lstStyle/>
+          <a:p>
+            <a:pPr algn="just"/>
+            <a:r>
+              <a:rPr lang="en-GB" sz="900" dirty="0" smtClean="0"/>
+              <a:t>Comparisons of the </a:t>
+            </a:r>
+            <a:r>
+              <a:rPr lang="el-GR" sz="900" dirty="0" smtClean="0"/>
+              <a:t>γ</a:t>
+            </a:r>
+            <a:r>
+              <a:rPr lang="en-GB" sz="900" dirty="0"/>
+              <a:t> </a:t>
+            </a:r>
+            <a:r>
+              <a:rPr lang="en-GB" sz="900" dirty="0" smtClean="0"/>
+              <a:t>statistic of the sampled PBD tree and the posterior. 0 indicates no difference, &lt;0 a higher posterior </a:t>
+            </a:r>
+            <a:r>
+              <a:rPr lang="el-GR" sz="900" dirty="0" smtClean="0"/>
+              <a:t>γ</a:t>
+            </a:r>
+            <a:r>
+              <a:rPr lang="en-GB" sz="900" dirty="0" smtClean="0"/>
+              <a:t>, and &gt;0 a higher </a:t>
+            </a:r>
+            <a:r>
+              <a:rPr lang="el-GR" sz="900" dirty="0" smtClean="0"/>
+              <a:t>γ</a:t>
+            </a:r>
+            <a:r>
+              <a:rPr lang="en-GB" sz="900" dirty="0" smtClean="0"/>
+              <a:t> of the sampled PBD tree.</a:t>
+            </a:r>
+          </a:p>
+          <a:p>
+            <a:pPr algn="just"/>
+            <a:endParaRPr lang="en-GB" sz="900" dirty="0"/>
+          </a:p>
+          <a:p>
+            <a:pPr algn="just"/>
+            <a:r>
+              <a:rPr lang="en-GB" sz="900" dirty="0" smtClean="0"/>
+              <a:t>Different speciation completion rates (SCR) appear to have little impact on the error in the recovery of the gamma PBD trees by BEAST2.  </a:t>
+            </a:r>
+          </a:p>
+          <a:p>
+            <a:pPr algn="just"/>
+            <a:endParaRPr lang="en-GB" sz="900" dirty="0"/>
+          </a:p>
+          <a:p>
+            <a:pPr algn="just"/>
+            <a:r>
+              <a:rPr lang="en-GB" sz="900" dirty="0" smtClean="0"/>
+              <a:t>Other parameters, like the mutation rate shown here, have a much greater impact on the difference in </a:t>
+            </a:r>
+            <a:r>
+              <a:rPr lang="el-GR" sz="900" dirty="0" smtClean="0"/>
+              <a:t>γ</a:t>
+            </a:r>
+            <a:r>
+              <a:rPr lang="en-GB" sz="900" dirty="0" smtClean="0"/>
+              <a:t>.</a:t>
+            </a:r>
+            <a:endParaRPr lang="en-GB" sz="900" dirty="0"/>
           </a:p>
         </p:txBody>
       </p:sp>

</xml_diff>